<commit_message>
changed visNetwork to picture
</commit_message>
<xml_diff>
--- a/thesis/BSS_pic.pptx
+++ b/thesis/BSS_pic.pptx
@@ -7,6 +7,7 @@
   <p:sldIdLst>
     <p:sldId id="256" r:id="rId2"/>
     <p:sldId id="257" r:id="rId3"/>
+    <p:sldId id="258" r:id="rId4"/>
   </p:sldIdLst>
   <p:sldSz cx="12192000" cy="6858000"/>
   <p:notesSz cx="6858000" cy="9144000"/>
@@ -260,7 +261,7 @@
           <a:p>
             <a:fld id="{3F7A6499-4D5B-41F3-A4B0-AD2534926E51}" type="datetimeFigureOut">
               <a:rPr lang="en-US" smtClean="0"/>
-              <a:t>5/7/2019</a:t>
+              <a:t>5/29/2019</a:t>
             </a:fld>
             <a:endParaRPr lang="en-US"/>
           </a:p>
@@ -458,7 +459,7 @@
           <a:p>
             <a:fld id="{3F7A6499-4D5B-41F3-A4B0-AD2534926E51}" type="datetimeFigureOut">
               <a:rPr lang="en-US" smtClean="0"/>
-              <a:t>5/7/2019</a:t>
+              <a:t>5/29/2019</a:t>
             </a:fld>
             <a:endParaRPr lang="en-US"/>
           </a:p>
@@ -666,7 +667,7 @@
           <a:p>
             <a:fld id="{3F7A6499-4D5B-41F3-A4B0-AD2534926E51}" type="datetimeFigureOut">
               <a:rPr lang="en-US" smtClean="0"/>
-              <a:t>5/7/2019</a:t>
+              <a:t>5/29/2019</a:t>
             </a:fld>
             <a:endParaRPr lang="en-US"/>
           </a:p>
@@ -864,7 +865,7 @@
           <a:p>
             <a:fld id="{3F7A6499-4D5B-41F3-A4B0-AD2534926E51}" type="datetimeFigureOut">
               <a:rPr lang="en-US" smtClean="0"/>
-              <a:t>5/7/2019</a:t>
+              <a:t>5/29/2019</a:t>
             </a:fld>
             <a:endParaRPr lang="en-US"/>
           </a:p>
@@ -1139,7 +1140,7 @@
           <a:p>
             <a:fld id="{3F7A6499-4D5B-41F3-A4B0-AD2534926E51}" type="datetimeFigureOut">
               <a:rPr lang="en-US" smtClean="0"/>
-              <a:t>5/7/2019</a:t>
+              <a:t>5/29/2019</a:t>
             </a:fld>
             <a:endParaRPr lang="en-US"/>
           </a:p>
@@ -1404,7 +1405,7 @@
           <a:p>
             <a:fld id="{3F7A6499-4D5B-41F3-A4B0-AD2534926E51}" type="datetimeFigureOut">
               <a:rPr lang="en-US" smtClean="0"/>
-              <a:t>5/7/2019</a:t>
+              <a:t>5/29/2019</a:t>
             </a:fld>
             <a:endParaRPr lang="en-US"/>
           </a:p>
@@ -1816,7 +1817,7 @@
           <a:p>
             <a:fld id="{3F7A6499-4D5B-41F3-A4B0-AD2534926E51}" type="datetimeFigureOut">
               <a:rPr lang="en-US" smtClean="0"/>
-              <a:t>5/7/2019</a:t>
+              <a:t>5/29/2019</a:t>
             </a:fld>
             <a:endParaRPr lang="en-US"/>
           </a:p>
@@ -1957,7 +1958,7 @@
           <a:p>
             <a:fld id="{3F7A6499-4D5B-41F3-A4B0-AD2534926E51}" type="datetimeFigureOut">
               <a:rPr lang="en-US" smtClean="0"/>
-              <a:t>5/7/2019</a:t>
+              <a:t>5/29/2019</a:t>
             </a:fld>
             <a:endParaRPr lang="en-US"/>
           </a:p>
@@ -2070,7 +2071,7 @@
           <a:p>
             <a:fld id="{3F7A6499-4D5B-41F3-A4B0-AD2534926E51}" type="datetimeFigureOut">
               <a:rPr lang="en-US" smtClean="0"/>
-              <a:t>5/7/2019</a:t>
+              <a:t>5/29/2019</a:t>
             </a:fld>
             <a:endParaRPr lang="en-US"/>
           </a:p>
@@ -2381,7 +2382,7 @@
           <a:p>
             <a:fld id="{3F7A6499-4D5B-41F3-A4B0-AD2534926E51}" type="datetimeFigureOut">
               <a:rPr lang="en-US" smtClean="0"/>
-              <a:t>5/7/2019</a:t>
+              <a:t>5/29/2019</a:t>
             </a:fld>
             <a:endParaRPr lang="en-US"/>
           </a:p>
@@ -2669,7 +2670,7 @@
           <a:p>
             <a:fld id="{3F7A6499-4D5B-41F3-A4B0-AD2534926E51}" type="datetimeFigureOut">
               <a:rPr lang="en-US" smtClean="0"/>
-              <a:t>5/7/2019</a:t>
+              <a:t>5/29/2019</a:t>
             </a:fld>
             <a:endParaRPr lang="en-US"/>
           </a:p>
@@ -2910,7 +2911,7 @@
           <a:p>
             <a:fld id="{3F7A6499-4D5B-41F3-A4B0-AD2534926E51}" type="datetimeFigureOut">
               <a:rPr lang="en-US" smtClean="0"/>
-              <a:t>5/7/2019</a:t>
+              <a:t>5/29/2019</a:t>
             </a:fld>
             <a:endParaRPr lang="en-US"/>
           </a:p>
@@ -6241,6 +6242,3142 @@
 </p:sld>
 </file>
 
+<file path=ppt/slides/slide3.xml><?xml version="1.0" encoding="utf-8"?>
+<p:sld xmlns:a="http://schemas.openxmlformats.org/drawingml/2006/main" xmlns:r="http://schemas.openxmlformats.org/officeDocument/2006/relationships" xmlns:p="http://schemas.openxmlformats.org/presentationml/2006/main">
+  <p:cSld>
+    <p:spTree>
+      <p:nvGrpSpPr>
+        <p:cNvPr id="1" name=""/>
+        <p:cNvGrpSpPr/>
+        <p:nvPr/>
+      </p:nvGrpSpPr>
+      <p:grpSpPr>
+        <a:xfrm>
+          <a:off x="0" y="0"/>
+          <a:ext cx="0" cy="0"/>
+          <a:chOff x="0" y="0"/>
+          <a:chExt cx="0" cy="0"/>
+        </a:xfrm>
+      </p:grpSpPr>
+      <p:pic>
+        <p:nvPicPr>
+          <p:cNvPr id="4" name="Picture 3">
+            <a:extLst>
+              <a:ext uri="{FF2B5EF4-FFF2-40B4-BE49-F238E27FC236}">
+                <a16:creationId xmlns:a16="http://schemas.microsoft.com/office/drawing/2014/main" id="{AE988D7B-5261-436B-A7B5-85E2C37256C0}"/>
+              </a:ext>
+            </a:extLst>
+          </p:cNvPr>
+          <p:cNvPicPr>
+            <a:picLocks noChangeAspect="1"/>
+          </p:cNvPicPr>
+          <p:nvPr/>
+        </p:nvPicPr>
+        <p:blipFill>
+          <a:blip r:embed="rId2"/>
+          <a:stretch>
+            <a:fillRect/>
+          </a:stretch>
+        </p:blipFill>
+        <p:spPr>
+          <a:xfrm>
+            <a:off x="1041433" y="109246"/>
+            <a:ext cx="3850826" cy="3622999"/>
+          </a:xfrm>
+          <a:prstGeom prst="rect">
+            <a:avLst/>
+          </a:prstGeom>
+        </p:spPr>
+      </p:pic>
+      <p:grpSp>
+        <p:nvGrpSpPr>
+          <p:cNvPr id="61" name="Group 60">
+            <a:extLst>
+              <a:ext uri="{FF2B5EF4-FFF2-40B4-BE49-F238E27FC236}">
+                <a16:creationId xmlns:a16="http://schemas.microsoft.com/office/drawing/2014/main" id="{AD5645E0-AA4F-4835-8E5B-4FD25CF0F7C5}"/>
+              </a:ext>
+            </a:extLst>
+          </p:cNvPr>
+          <p:cNvGrpSpPr/>
+          <p:nvPr/>
+        </p:nvGrpSpPr>
+        <p:grpSpPr>
+          <a:xfrm>
+            <a:off x="5529662" y="780176"/>
+            <a:ext cx="4220703" cy="3927445"/>
+            <a:chOff x="5529662" y="780176"/>
+            <a:chExt cx="4220703" cy="3927445"/>
+          </a:xfrm>
+        </p:grpSpPr>
+        <p:cxnSp>
+          <p:nvCxnSpPr>
+            <p:cNvPr id="11" name="Straight Arrow Connector 10">
+              <a:extLst>
+                <a:ext uri="{FF2B5EF4-FFF2-40B4-BE49-F238E27FC236}">
+                  <a16:creationId xmlns:a16="http://schemas.microsoft.com/office/drawing/2014/main" id="{159851CD-D400-485C-89FD-C9AE12DE5E25}"/>
+                </a:ext>
+              </a:extLst>
+            </p:cNvPr>
+            <p:cNvCxnSpPr>
+              <a:stCxn id="7" idx="2"/>
+              <a:endCxn id="8" idx="0"/>
+            </p:cNvCxnSpPr>
+            <p:nvPr/>
+          </p:nvCxnSpPr>
+          <p:spPr>
+            <a:xfrm>
+              <a:off x="7299741" y="1048624"/>
+              <a:ext cx="2" cy="469114"/>
+            </a:xfrm>
+            <a:prstGeom prst="straightConnector1">
+              <a:avLst/>
+            </a:prstGeom>
+            <a:ln>
+              <a:tailEnd type="triangle"/>
+            </a:ln>
+          </p:spPr>
+          <p:style>
+            <a:lnRef idx="1">
+              <a:schemeClr val="accent1"/>
+            </a:lnRef>
+            <a:fillRef idx="0">
+              <a:schemeClr val="accent1"/>
+            </a:fillRef>
+            <a:effectRef idx="0">
+              <a:schemeClr val="accent1"/>
+            </a:effectRef>
+            <a:fontRef idx="minor">
+              <a:schemeClr val="tx1"/>
+            </a:fontRef>
+          </p:style>
+        </p:cxnSp>
+        <p:sp>
+          <p:nvSpPr>
+            <p:cNvPr id="7" name="Rectangle: Rounded Corners 6">
+              <a:extLst>
+                <a:ext uri="{FF2B5EF4-FFF2-40B4-BE49-F238E27FC236}">
+                  <a16:creationId xmlns:a16="http://schemas.microsoft.com/office/drawing/2014/main" id="{EA29C6E5-5613-4851-8E44-50C3A6BC891E}"/>
+                </a:ext>
+              </a:extLst>
+            </p:cNvPr>
+            <p:cNvSpPr/>
+            <p:nvPr/>
+          </p:nvSpPr>
+          <p:spPr>
+            <a:xfrm>
+              <a:off x="6708317" y="780176"/>
+              <a:ext cx="1182847" cy="268448"/>
+            </a:xfrm>
+            <a:prstGeom prst="roundRect">
+              <a:avLst/>
+            </a:prstGeom>
+            <a:solidFill>
+              <a:schemeClr val="accent1">
+                <a:alpha val="50000"/>
+              </a:schemeClr>
+            </a:solidFill>
+            <a:ln>
+              <a:noFill/>
+            </a:ln>
+          </p:spPr>
+          <p:style>
+            <a:lnRef idx="0">
+              <a:scrgbClr r="0" g="0" b="0"/>
+            </a:lnRef>
+            <a:fillRef idx="0">
+              <a:scrgbClr r="0" g="0" b="0"/>
+            </a:fillRef>
+            <a:effectRef idx="0">
+              <a:scrgbClr r="0" g="0" b="0"/>
+            </a:effectRef>
+            <a:fontRef idx="minor">
+              <a:schemeClr val="lt1"/>
+            </a:fontRef>
+          </p:style>
+          <p:txBody>
+            <a:bodyPr rtlCol="0" anchor="ctr"/>
+            <a:lstStyle/>
+            <a:p>
+              <a:pPr algn="ctr"/>
+              <a:r>
+                <a:rPr lang="en-US" sz="1400" dirty="0">
+                  <a:solidFill>
+                    <a:schemeClr val="tx1"/>
+                  </a:solidFill>
+                </a:rPr>
+                <a:t>Observation</a:t>
+              </a:r>
+            </a:p>
+          </p:txBody>
+        </p:sp>
+        <p:sp>
+          <p:nvSpPr>
+            <p:cNvPr id="8" name="Rectangle: Rounded Corners 7">
+              <a:extLst>
+                <a:ext uri="{FF2B5EF4-FFF2-40B4-BE49-F238E27FC236}">
+                  <a16:creationId xmlns:a16="http://schemas.microsoft.com/office/drawing/2014/main" id="{D2A9D4EF-387E-4660-878A-E54E653A31FE}"/>
+                </a:ext>
+              </a:extLst>
+            </p:cNvPr>
+            <p:cNvSpPr/>
+            <p:nvPr/>
+          </p:nvSpPr>
+          <p:spPr>
+            <a:xfrm>
+              <a:off x="6230146" y="1517738"/>
+              <a:ext cx="2139193" cy="268449"/>
+            </a:xfrm>
+            <a:prstGeom prst="roundRect">
+              <a:avLst/>
+            </a:prstGeom>
+            <a:solidFill>
+              <a:schemeClr val="accent1">
+                <a:alpha val="50000"/>
+              </a:schemeClr>
+            </a:solidFill>
+            <a:ln>
+              <a:noFill/>
+            </a:ln>
+          </p:spPr>
+          <p:style>
+            <a:lnRef idx="0">
+              <a:scrgbClr r="0" g="0" b="0"/>
+            </a:lnRef>
+            <a:fillRef idx="0">
+              <a:scrgbClr r="0" g="0" b="0"/>
+            </a:fillRef>
+            <a:effectRef idx="0">
+              <a:scrgbClr r="0" g="0" b="0"/>
+            </a:effectRef>
+            <a:fontRef idx="minor">
+              <a:schemeClr val="lt1"/>
+            </a:fontRef>
+          </p:style>
+          <p:txBody>
+            <a:bodyPr rtlCol="0" anchor="ctr"/>
+            <a:lstStyle/>
+            <a:p>
+              <a:pPr algn="ctr"/>
+              <a:r>
+                <a:rPr lang="en-US" sz="1400" dirty="0">
+                  <a:solidFill>
+                    <a:schemeClr val="tx1"/>
+                  </a:solidFill>
+                </a:rPr>
+                <a:t>Autocovariance Matrices</a:t>
+              </a:r>
+            </a:p>
+          </p:txBody>
+        </p:sp>
+        <p:sp>
+          <p:nvSpPr>
+            <p:cNvPr id="9" name="TextBox 8">
+              <a:extLst>
+                <a:ext uri="{FF2B5EF4-FFF2-40B4-BE49-F238E27FC236}">
+                  <a16:creationId xmlns:a16="http://schemas.microsoft.com/office/drawing/2014/main" id="{DB12E8C5-EAB4-4F9C-BDE3-3F2ED5FD14F5}"/>
+                </a:ext>
+              </a:extLst>
+            </p:cNvPr>
+            <p:cNvSpPr txBox="1"/>
+            <p:nvPr/>
+          </p:nvSpPr>
+          <p:spPr>
+            <a:xfrm>
+              <a:off x="6375450" y="1152376"/>
+              <a:ext cx="1848583" cy="261610"/>
+            </a:xfrm>
+            <a:prstGeom prst="rect">
+              <a:avLst/>
+            </a:prstGeom>
+            <a:noFill/>
+          </p:spPr>
+          <p:txBody>
+            <a:bodyPr wrap="none" rtlCol="0">
+              <a:spAutoFit/>
+            </a:bodyPr>
+            <a:lstStyle/>
+            <a:p>
+              <a:r>
+                <a:rPr lang="en-US" sz="1100" i="1" dirty="0">
+                  <a:solidFill>
+                    <a:schemeClr val="tx1">
+                      <a:lumMod val="50000"/>
+                      <a:lumOff val="50000"/>
+                    </a:schemeClr>
+                  </a:solidFill>
+                </a:rPr>
+                <a:t>Pre-processing and centering</a:t>
+              </a:r>
+            </a:p>
+          </p:txBody>
+        </p:sp>
+        <p:sp>
+          <p:nvSpPr>
+            <p:cNvPr id="13" name="TextBox 12">
+              <a:extLst>
+                <a:ext uri="{FF2B5EF4-FFF2-40B4-BE49-F238E27FC236}">
+                  <a16:creationId xmlns:a16="http://schemas.microsoft.com/office/drawing/2014/main" id="{0B9AE4A1-CB56-412B-9B44-4B47EB02BEFA}"/>
+                </a:ext>
+              </a:extLst>
+            </p:cNvPr>
+            <p:cNvSpPr txBox="1"/>
+            <p:nvPr/>
+          </p:nvSpPr>
+          <p:spPr>
+            <a:xfrm>
+              <a:off x="6230146" y="1789940"/>
+              <a:ext cx="2159566" cy="261610"/>
+            </a:xfrm>
+            <a:prstGeom prst="rect">
+              <a:avLst/>
+            </a:prstGeom>
+            <a:noFill/>
+          </p:spPr>
+          <p:txBody>
+            <a:bodyPr wrap="none" rtlCol="0">
+              <a:spAutoFit/>
+            </a:bodyPr>
+            <a:lstStyle/>
+            <a:p>
+              <a:r>
+                <a:rPr lang="en-US" sz="1100" i="1" dirty="0">
+                  <a:solidFill>
+                    <a:schemeClr val="tx1">
+                      <a:lumMod val="50000"/>
+                      <a:lumOff val="50000"/>
+                    </a:schemeClr>
+                  </a:solidFill>
+                </a:rPr>
+                <a:t>Decomposition of Autocovariances</a:t>
+              </a:r>
+            </a:p>
+          </p:txBody>
+        </p:sp>
+        <mc:AlternateContent xmlns:mc="http://schemas.openxmlformats.org/markup-compatibility/2006">
+          <mc:Choice xmlns:a14="http://schemas.microsoft.com/office/drawing/2010/main" Requires="a14">
+            <p:sp>
+              <p:nvSpPr>
+                <p:cNvPr id="14" name="Rectangle: Diagonal Corners Snipped 13">
+                  <a:extLst>
+                    <a:ext uri="{FF2B5EF4-FFF2-40B4-BE49-F238E27FC236}">
+                      <a16:creationId xmlns:a16="http://schemas.microsoft.com/office/drawing/2014/main" id="{AC24F133-EAF6-4A30-9D7E-48FD4618D7E7}"/>
+                    </a:ext>
+                  </a:extLst>
+                </p:cNvPr>
+                <p:cNvSpPr/>
+                <p:nvPr/>
+              </p:nvSpPr>
+              <p:spPr>
+                <a:xfrm>
+                  <a:off x="6193794" y="2262230"/>
+                  <a:ext cx="446119" cy="329968"/>
+                </a:xfrm>
+                <a:prstGeom prst="snip2DiagRect">
+                  <a:avLst/>
+                </a:prstGeom>
+                <a:solidFill>
+                  <a:schemeClr val="accent3">
+                    <a:alpha val="50000"/>
+                  </a:schemeClr>
+                </a:solidFill>
+                <a:ln>
+                  <a:noFill/>
+                </a:ln>
+              </p:spPr>
+              <p:style>
+                <a:lnRef idx="0">
+                  <a:scrgbClr r="0" g="0" b="0"/>
+                </a:lnRef>
+                <a:fillRef idx="0">
+                  <a:scrgbClr r="0" g="0" b="0"/>
+                </a:fillRef>
+                <a:effectRef idx="0">
+                  <a:scrgbClr r="0" g="0" b="0"/>
+                </a:effectRef>
+                <a:fontRef idx="minor">
+                  <a:schemeClr val="lt1"/>
+                </a:fontRef>
+              </p:style>
+              <p:txBody>
+                <a:bodyPr rtlCol="0" anchor="ctr"/>
+                <a:lstStyle/>
+                <a:p>
+                  <a:pPr algn="ctr"/>
+                  <a14:m>
+                    <m:oMathPara xmlns:m="http://schemas.openxmlformats.org/officeDocument/2006/math">
+                      <m:oMathParaPr>
+                        <m:jc m:val="centerGroup"/>
+                      </m:oMathParaPr>
+                      <m:oMath xmlns:m="http://schemas.openxmlformats.org/officeDocument/2006/math">
+                        <m:acc>
+                          <m:accPr>
+                            <m:chr m:val="̂"/>
+                            <m:ctrlPr>
+                              <a:rPr lang="en-US" sz="1400" i="1" smtClean="0">
+                                <a:solidFill>
+                                  <a:schemeClr val="tx1"/>
+                                </a:solidFill>
+                                <a:latin typeface="Cambria Math" panose="02040503050406030204" pitchFamily="18" charset="0"/>
+                              </a:rPr>
+                            </m:ctrlPr>
+                          </m:accPr>
+                          <m:e>
+                            <m:sSub>
+                              <m:sSubPr>
+                                <m:ctrlPr>
+                                  <a:rPr lang="en-US" sz="1400" i="1" smtClean="0">
+                                    <a:solidFill>
+                                      <a:schemeClr val="tx1"/>
+                                    </a:solidFill>
+                                    <a:latin typeface="Cambria Math" panose="02040503050406030204" pitchFamily="18" charset="0"/>
+                                  </a:rPr>
+                                </m:ctrlPr>
+                              </m:sSubPr>
+                              <m:e>
+                                <m:r>
+                                  <a:rPr lang="en-US" sz="1400" i="1" smtClean="0">
+                                    <a:solidFill>
+                                      <a:schemeClr val="tx1"/>
+                                    </a:solidFill>
+                                    <a:latin typeface="Cambria Math" panose="02040503050406030204" pitchFamily="18" charset="0"/>
+                                    <a:ea typeface="Cambria Math" panose="02040503050406030204" pitchFamily="18" charset="0"/>
+                                  </a:rPr>
+                                  <m:t>𝛽</m:t>
+                                </m:r>
+                              </m:e>
+                              <m:sub>
+                                <m:r>
+                                  <a:rPr lang="en-US" sz="1400" b="0" i="1" smtClean="0">
+                                    <a:solidFill>
+                                      <a:schemeClr val="tx1"/>
+                                    </a:solidFill>
+                                    <a:latin typeface="Cambria Math" panose="02040503050406030204" pitchFamily="18" charset="0"/>
+                                  </a:rPr>
+                                  <m:t>1</m:t>
+                                </m:r>
+                              </m:sub>
+                            </m:sSub>
+                          </m:e>
+                        </m:acc>
+                      </m:oMath>
+                    </m:oMathPara>
+                  </a14:m>
+                  <a:endParaRPr lang="en-US" sz="1400" dirty="0">
+                    <a:solidFill>
+                      <a:schemeClr val="tx1"/>
+                    </a:solidFill>
+                  </a:endParaRPr>
+                </a:p>
+              </p:txBody>
+            </p:sp>
+          </mc:Choice>
+          <mc:Fallback>
+            <p:sp>
+              <p:nvSpPr>
+                <p:cNvPr id="14" name="Rectangle: Diagonal Corners Snipped 13">
+                  <a:extLst>
+                    <a:ext uri="{FF2B5EF4-FFF2-40B4-BE49-F238E27FC236}">
+                      <a16:creationId xmlns:a16="http://schemas.microsoft.com/office/drawing/2014/main" id="{AC24F133-EAF6-4A30-9D7E-48FD4618D7E7}"/>
+                    </a:ext>
+                  </a:extLst>
+                </p:cNvPr>
+                <p:cNvSpPr>
+                  <a:spLocks noRot="1" noChangeAspect="1" noMove="1" noResize="1" noEditPoints="1" noAdjustHandles="1" noChangeArrowheads="1" noChangeShapeType="1" noTextEdit="1"/>
+                </p:cNvSpPr>
+                <p:nvPr/>
+              </p:nvSpPr>
+              <p:spPr>
+                <a:xfrm>
+                  <a:off x="6193794" y="2262230"/>
+                  <a:ext cx="446119" cy="329968"/>
+                </a:xfrm>
+                <a:prstGeom prst="snip2DiagRect">
+                  <a:avLst/>
+                </a:prstGeom>
+                <a:blipFill>
+                  <a:blip r:embed="rId3"/>
+                  <a:stretch>
+                    <a:fillRect t="-1852" b="-5556"/>
+                  </a:stretch>
+                </a:blipFill>
+                <a:ln>
+                  <a:noFill/>
+                </a:ln>
+              </p:spPr>
+              <p:txBody>
+                <a:bodyPr/>
+                <a:lstStyle/>
+                <a:p>
+                  <a:r>
+                    <a:rPr lang="en-US">
+                      <a:noFill/>
+                    </a:rPr>
+                    <a:t> </a:t>
+                  </a:r>
+                </a:p>
+              </p:txBody>
+            </p:sp>
+          </mc:Fallback>
+        </mc:AlternateContent>
+        <mc:AlternateContent xmlns:mc="http://schemas.openxmlformats.org/markup-compatibility/2006">
+          <mc:Choice xmlns:a14="http://schemas.microsoft.com/office/drawing/2010/main" Requires="a14">
+            <p:sp>
+              <p:nvSpPr>
+                <p:cNvPr id="15" name="Rectangle: Diagonal Corners Snipped 14">
+                  <a:extLst>
+                    <a:ext uri="{FF2B5EF4-FFF2-40B4-BE49-F238E27FC236}">
+                      <a16:creationId xmlns:a16="http://schemas.microsoft.com/office/drawing/2014/main" id="{8CEDF016-0FF3-464B-AAB8-09AE41B6E341}"/>
+                    </a:ext>
+                  </a:extLst>
+                </p:cNvPr>
+                <p:cNvSpPr/>
+                <p:nvPr/>
+              </p:nvSpPr>
+              <p:spPr>
+                <a:xfrm>
+                  <a:off x="7076680" y="2262230"/>
+                  <a:ext cx="446119" cy="329968"/>
+                </a:xfrm>
+                <a:prstGeom prst="snip2DiagRect">
+                  <a:avLst/>
+                </a:prstGeom>
+                <a:solidFill>
+                  <a:schemeClr val="accent3">
+                    <a:alpha val="50000"/>
+                  </a:schemeClr>
+                </a:solidFill>
+                <a:ln>
+                  <a:noFill/>
+                </a:ln>
+              </p:spPr>
+              <p:style>
+                <a:lnRef idx="0">
+                  <a:scrgbClr r="0" g="0" b="0"/>
+                </a:lnRef>
+                <a:fillRef idx="0">
+                  <a:scrgbClr r="0" g="0" b="0"/>
+                </a:fillRef>
+                <a:effectRef idx="0">
+                  <a:scrgbClr r="0" g="0" b="0"/>
+                </a:effectRef>
+                <a:fontRef idx="minor">
+                  <a:schemeClr val="lt1"/>
+                </a:fontRef>
+              </p:style>
+              <p:txBody>
+                <a:bodyPr rtlCol="0" anchor="ctr"/>
+                <a:lstStyle/>
+                <a:p>
+                  <a:pPr algn="ctr"/>
+                  <a14:m>
+                    <m:oMathPara xmlns:m="http://schemas.openxmlformats.org/officeDocument/2006/math">
+                      <m:oMathParaPr>
+                        <m:jc m:val="centerGroup"/>
+                      </m:oMathParaPr>
+                      <m:oMath xmlns:m="http://schemas.openxmlformats.org/officeDocument/2006/math">
+                        <m:acc>
+                          <m:accPr>
+                            <m:chr m:val="̂"/>
+                            <m:ctrlPr>
+                              <a:rPr lang="en-US" sz="1400" i="1" smtClean="0">
+                                <a:solidFill>
+                                  <a:schemeClr val="tx1"/>
+                                </a:solidFill>
+                                <a:latin typeface="Cambria Math" panose="02040503050406030204" pitchFamily="18" charset="0"/>
+                              </a:rPr>
+                            </m:ctrlPr>
+                          </m:accPr>
+                          <m:e>
+                            <m:sSub>
+                              <m:sSubPr>
+                                <m:ctrlPr>
+                                  <a:rPr lang="en-US" sz="1400" i="1">
+                                    <a:solidFill>
+                                      <a:schemeClr val="tx1"/>
+                                    </a:solidFill>
+                                    <a:latin typeface="Cambria Math" panose="02040503050406030204" pitchFamily="18" charset="0"/>
+                                  </a:rPr>
+                                </m:ctrlPr>
+                              </m:sSubPr>
+                              <m:e>
+                                <m:r>
+                                  <a:rPr lang="en-US" sz="1400" i="1">
+                                    <a:solidFill>
+                                      <a:schemeClr val="tx1"/>
+                                    </a:solidFill>
+                                    <a:latin typeface="Cambria Math" panose="02040503050406030204" pitchFamily="18" charset="0"/>
+                                    <a:ea typeface="Cambria Math" panose="02040503050406030204" pitchFamily="18" charset="0"/>
+                                  </a:rPr>
+                                  <m:t>𝛽</m:t>
+                                </m:r>
+                              </m:e>
+                              <m:sub>
+                                <m:r>
+                                  <a:rPr lang="en-US" sz="1400" b="0" i="1" smtClean="0">
+                                    <a:solidFill>
+                                      <a:schemeClr val="tx1"/>
+                                    </a:solidFill>
+                                    <a:latin typeface="Cambria Math" panose="02040503050406030204" pitchFamily="18" charset="0"/>
+                                    <a:ea typeface="Cambria Math" panose="02040503050406030204" pitchFamily="18" charset="0"/>
+                                  </a:rPr>
+                                  <m:t>2</m:t>
+                                </m:r>
+                              </m:sub>
+                            </m:sSub>
+                          </m:e>
+                        </m:acc>
+                      </m:oMath>
+                    </m:oMathPara>
+                  </a14:m>
+                  <a:endParaRPr lang="en-US" sz="1400" dirty="0">
+                    <a:solidFill>
+                      <a:schemeClr val="tx1"/>
+                    </a:solidFill>
+                  </a:endParaRPr>
+                </a:p>
+              </p:txBody>
+            </p:sp>
+          </mc:Choice>
+          <mc:Fallback>
+            <p:sp>
+              <p:nvSpPr>
+                <p:cNvPr id="15" name="Rectangle: Diagonal Corners Snipped 14">
+                  <a:extLst>
+                    <a:ext uri="{FF2B5EF4-FFF2-40B4-BE49-F238E27FC236}">
+                      <a16:creationId xmlns:a16="http://schemas.microsoft.com/office/drawing/2014/main" id="{8CEDF016-0FF3-464B-AAB8-09AE41B6E341}"/>
+                    </a:ext>
+                  </a:extLst>
+                </p:cNvPr>
+                <p:cNvSpPr>
+                  <a:spLocks noRot="1" noChangeAspect="1" noMove="1" noResize="1" noEditPoints="1" noAdjustHandles="1" noChangeArrowheads="1" noChangeShapeType="1" noTextEdit="1"/>
+                </p:cNvSpPr>
+                <p:nvPr/>
+              </p:nvSpPr>
+              <p:spPr>
+                <a:xfrm>
+                  <a:off x="7076680" y="2262230"/>
+                  <a:ext cx="446119" cy="329968"/>
+                </a:xfrm>
+                <a:prstGeom prst="snip2DiagRect">
+                  <a:avLst/>
+                </a:prstGeom>
+                <a:blipFill>
+                  <a:blip r:embed="rId4"/>
+                  <a:stretch>
+                    <a:fillRect t="-1852" b="-5556"/>
+                  </a:stretch>
+                </a:blipFill>
+                <a:ln>
+                  <a:noFill/>
+                </a:ln>
+              </p:spPr>
+              <p:txBody>
+                <a:bodyPr/>
+                <a:lstStyle/>
+                <a:p>
+                  <a:r>
+                    <a:rPr lang="en-US">
+                      <a:noFill/>
+                    </a:rPr>
+                    <a:t> </a:t>
+                  </a:r>
+                </a:p>
+              </p:txBody>
+            </p:sp>
+          </mc:Fallback>
+        </mc:AlternateContent>
+        <mc:AlternateContent xmlns:mc="http://schemas.openxmlformats.org/markup-compatibility/2006">
+          <mc:Choice xmlns:a14="http://schemas.microsoft.com/office/drawing/2010/main" Requires="a14">
+            <p:sp>
+              <p:nvSpPr>
+                <p:cNvPr id="16" name="Rectangle: Diagonal Corners Snipped 15">
+                  <a:extLst>
+                    <a:ext uri="{FF2B5EF4-FFF2-40B4-BE49-F238E27FC236}">
+                      <a16:creationId xmlns:a16="http://schemas.microsoft.com/office/drawing/2014/main" id="{59D3D6DB-6157-457F-9081-0EA3B1134B2E}"/>
+                    </a:ext>
+                  </a:extLst>
+                </p:cNvPr>
+                <p:cNvSpPr/>
+                <p:nvPr/>
+              </p:nvSpPr>
+              <p:spPr>
+                <a:xfrm>
+                  <a:off x="8000973" y="2262230"/>
+                  <a:ext cx="446119" cy="329968"/>
+                </a:xfrm>
+                <a:prstGeom prst="snip2DiagRect">
+                  <a:avLst/>
+                </a:prstGeom>
+                <a:solidFill>
+                  <a:schemeClr val="accent3">
+                    <a:alpha val="50000"/>
+                  </a:schemeClr>
+                </a:solidFill>
+                <a:ln>
+                  <a:noFill/>
+                </a:ln>
+              </p:spPr>
+              <p:style>
+                <a:lnRef idx="0">
+                  <a:scrgbClr r="0" g="0" b="0"/>
+                </a:lnRef>
+                <a:fillRef idx="0">
+                  <a:scrgbClr r="0" g="0" b="0"/>
+                </a:fillRef>
+                <a:effectRef idx="0">
+                  <a:scrgbClr r="0" g="0" b="0"/>
+                </a:effectRef>
+                <a:fontRef idx="minor">
+                  <a:schemeClr val="lt1"/>
+                </a:fontRef>
+              </p:style>
+              <p:txBody>
+                <a:bodyPr rtlCol="0" anchor="ctr"/>
+                <a:lstStyle/>
+                <a:p>
+                  <a:pPr algn="ctr"/>
+                  <a14:m>
+                    <m:oMathPara xmlns:m="http://schemas.openxmlformats.org/officeDocument/2006/math">
+                      <m:oMathParaPr>
+                        <m:jc m:val="centerGroup"/>
+                      </m:oMathParaPr>
+                      <m:oMath xmlns:m="http://schemas.openxmlformats.org/officeDocument/2006/math">
+                        <m:acc>
+                          <m:accPr>
+                            <m:chr m:val="̂"/>
+                            <m:ctrlPr>
+                              <a:rPr lang="en-US" sz="1400" i="1" smtClean="0">
+                                <a:solidFill>
+                                  <a:schemeClr val="tx1"/>
+                                </a:solidFill>
+                                <a:latin typeface="Cambria Math" panose="02040503050406030204" pitchFamily="18" charset="0"/>
+                              </a:rPr>
+                            </m:ctrlPr>
+                          </m:accPr>
+                          <m:e>
+                            <m:sSub>
+                              <m:sSubPr>
+                                <m:ctrlPr>
+                                  <a:rPr lang="en-US" sz="1400" i="1">
+                                    <a:solidFill>
+                                      <a:schemeClr val="tx1"/>
+                                    </a:solidFill>
+                                    <a:latin typeface="Cambria Math" panose="02040503050406030204" pitchFamily="18" charset="0"/>
+                                  </a:rPr>
+                                </m:ctrlPr>
+                              </m:sSubPr>
+                              <m:e>
+                                <m:r>
+                                  <a:rPr lang="en-US" sz="1400" i="1">
+                                    <a:solidFill>
+                                      <a:schemeClr val="tx1"/>
+                                    </a:solidFill>
+                                    <a:latin typeface="Cambria Math" panose="02040503050406030204" pitchFamily="18" charset="0"/>
+                                    <a:ea typeface="Cambria Math" panose="02040503050406030204" pitchFamily="18" charset="0"/>
+                                  </a:rPr>
+                                  <m:t>𝛽</m:t>
+                                </m:r>
+                              </m:e>
+                              <m:sub>
+                                <m:r>
+                                  <a:rPr lang="en-US" sz="1400" b="0" i="1" smtClean="0">
+                                    <a:solidFill>
+                                      <a:schemeClr val="tx1"/>
+                                    </a:solidFill>
+                                    <a:latin typeface="Cambria Math" panose="02040503050406030204" pitchFamily="18" charset="0"/>
+                                    <a:ea typeface="Cambria Math" panose="02040503050406030204" pitchFamily="18" charset="0"/>
+                                  </a:rPr>
+                                  <m:t>3</m:t>
+                                </m:r>
+                              </m:sub>
+                            </m:sSub>
+                          </m:e>
+                        </m:acc>
+                      </m:oMath>
+                    </m:oMathPara>
+                  </a14:m>
+                  <a:endParaRPr lang="en-US" sz="1400" dirty="0">
+                    <a:solidFill>
+                      <a:schemeClr val="tx1"/>
+                    </a:solidFill>
+                  </a:endParaRPr>
+                </a:p>
+              </p:txBody>
+            </p:sp>
+          </mc:Choice>
+          <mc:Fallback>
+            <p:sp>
+              <p:nvSpPr>
+                <p:cNvPr id="16" name="Rectangle: Diagonal Corners Snipped 15">
+                  <a:extLst>
+                    <a:ext uri="{FF2B5EF4-FFF2-40B4-BE49-F238E27FC236}">
+                      <a16:creationId xmlns:a16="http://schemas.microsoft.com/office/drawing/2014/main" id="{59D3D6DB-6157-457F-9081-0EA3B1134B2E}"/>
+                    </a:ext>
+                  </a:extLst>
+                </p:cNvPr>
+                <p:cNvSpPr>
+                  <a:spLocks noRot="1" noChangeAspect="1" noMove="1" noResize="1" noEditPoints="1" noAdjustHandles="1" noChangeArrowheads="1" noChangeShapeType="1" noTextEdit="1"/>
+                </p:cNvSpPr>
+                <p:nvPr/>
+              </p:nvSpPr>
+              <p:spPr>
+                <a:xfrm>
+                  <a:off x="8000973" y="2262230"/>
+                  <a:ext cx="446119" cy="329968"/>
+                </a:xfrm>
+                <a:prstGeom prst="snip2DiagRect">
+                  <a:avLst/>
+                </a:prstGeom>
+                <a:blipFill>
+                  <a:blip r:embed="rId5"/>
+                  <a:stretch>
+                    <a:fillRect t="-1852" b="-5556"/>
+                  </a:stretch>
+                </a:blipFill>
+                <a:ln>
+                  <a:noFill/>
+                </a:ln>
+              </p:spPr>
+              <p:txBody>
+                <a:bodyPr/>
+                <a:lstStyle/>
+                <a:p>
+                  <a:r>
+                    <a:rPr lang="en-US">
+                      <a:noFill/>
+                    </a:rPr>
+                    <a:t> </a:t>
+                  </a:r>
+                </a:p>
+              </p:txBody>
+            </p:sp>
+          </mc:Fallback>
+        </mc:AlternateContent>
+        <p:cxnSp>
+          <p:nvCxnSpPr>
+            <p:cNvPr id="17" name="Straight Arrow Connector 16">
+              <a:extLst>
+                <a:ext uri="{FF2B5EF4-FFF2-40B4-BE49-F238E27FC236}">
+                  <a16:creationId xmlns:a16="http://schemas.microsoft.com/office/drawing/2014/main" id="{1645E1B0-6711-4846-92EE-C89D13A6F77B}"/>
+                </a:ext>
+              </a:extLst>
+            </p:cNvPr>
+            <p:cNvCxnSpPr>
+              <a:cxnSpLocks/>
+              <a:stCxn id="8" idx="2"/>
+              <a:endCxn id="14" idx="3"/>
+            </p:cNvCxnSpPr>
+            <p:nvPr/>
+          </p:nvCxnSpPr>
+          <p:spPr>
+            <a:xfrm flipH="1">
+              <a:off x="6416854" y="1786187"/>
+              <a:ext cx="882889" cy="476043"/>
+            </a:xfrm>
+            <a:prstGeom prst="straightConnector1">
+              <a:avLst/>
+            </a:prstGeom>
+            <a:ln>
+              <a:tailEnd type="triangle"/>
+            </a:ln>
+          </p:spPr>
+          <p:style>
+            <a:lnRef idx="1">
+              <a:schemeClr val="accent1"/>
+            </a:lnRef>
+            <a:fillRef idx="0">
+              <a:schemeClr val="accent1"/>
+            </a:fillRef>
+            <a:effectRef idx="0">
+              <a:schemeClr val="accent1"/>
+            </a:effectRef>
+            <a:fontRef idx="minor">
+              <a:schemeClr val="tx1"/>
+            </a:fontRef>
+          </p:style>
+        </p:cxnSp>
+        <p:cxnSp>
+          <p:nvCxnSpPr>
+            <p:cNvPr id="20" name="Straight Arrow Connector 19">
+              <a:extLst>
+                <a:ext uri="{FF2B5EF4-FFF2-40B4-BE49-F238E27FC236}">
+                  <a16:creationId xmlns:a16="http://schemas.microsoft.com/office/drawing/2014/main" id="{51B1EE42-3C5C-4C65-B344-AA43F5BC41D3}"/>
+                </a:ext>
+              </a:extLst>
+            </p:cNvPr>
+            <p:cNvCxnSpPr>
+              <a:cxnSpLocks/>
+              <a:stCxn id="13" idx="0"/>
+              <a:endCxn id="15" idx="3"/>
+            </p:cNvCxnSpPr>
+            <p:nvPr/>
+          </p:nvCxnSpPr>
+          <p:spPr>
+            <a:xfrm flipH="1">
+              <a:off x="7299740" y="1789940"/>
+              <a:ext cx="10189" cy="472290"/>
+            </a:xfrm>
+            <a:prstGeom prst="straightConnector1">
+              <a:avLst/>
+            </a:prstGeom>
+            <a:ln>
+              <a:tailEnd type="triangle"/>
+            </a:ln>
+          </p:spPr>
+          <p:style>
+            <a:lnRef idx="1">
+              <a:schemeClr val="accent1"/>
+            </a:lnRef>
+            <a:fillRef idx="0">
+              <a:schemeClr val="accent1"/>
+            </a:fillRef>
+            <a:effectRef idx="0">
+              <a:schemeClr val="accent1"/>
+            </a:effectRef>
+            <a:fontRef idx="minor">
+              <a:schemeClr val="tx1"/>
+            </a:fontRef>
+          </p:style>
+        </p:cxnSp>
+        <p:cxnSp>
+          <p:nvCxnSpPr>
+            <p:cNvPr id="23" name="Straight Arrow Connector 22">
+              <a:extLst>
+                <a:ext uri="{FF2B5EF4-FFF2-40B4-BE49-F238E27FC236}">
+                  <a16:creationId xmlns:a16="http://schemas.microsoft.com/office/drawing/2014/main" id="{ACBF7D80-40D2-4EFE-A645-F342A99A9616}"/>
+                </a:ext>
+              </a:extLst>
+            </p:cNvPr>
+            <p:cNvCxnSpPr>
+              <a:cxnSpLocks/>
+              <a:stCxn id="13" idx="0"/>
+              <a:endCxn id="16" idx="3"/>
+            </p:cNvCxnSpPr>
+            <p:nvPr/>
+          </p:nvCxnSpPr>
+          <p:spPr>
+            <a:xfrm>
+              <a:off x="7309929" y="1789940"/>
+              <a:ext cx="914104" cy="472290"/>
+            </a:xfrm>
+            <a:prstGeom prst="straightConnector1">
+              <a:avLst/>
+            </a:prstGeom>
+            <a:ln>
+              <a:tailEnd type="triangle"/>
+            </a:ln>
+          </p:spPr>
+          <p:style>
+            <a:lnRef idx="1">
+              <a:schemeClr val="accent1"/>
+            </a:lnRef>
+            <a:fillRef idx="0">
+              <a:schemeClr val="accent1"/>
+            </a:fillRef>
+            <a:effectRef idx="0">
+              <a:schemeClr val="accent1"/>
+            </a:effectRef>
+            <a:fontRef idx="minor">
+              <a:schemeClr val="tx1"/>
+            </a:fontRef>
+          </p:style>
+        </p:cxnSp>
+        <mc:AlternateContent xmlns:mc="http://schemas.openxmlformats.org/markup-compatibility/2006">
+          <mc:Choice xmlns:a14="http://schemas.microsoft.com/office/drawing/2010/main" Requires="a14">
+            <p:sp>
+              <p:nvSpPr>
+                <p:cNvPr id="26" name="Rectangle: Single Corner Snipped 25">
+                  <a:extLst>
+                    <a:ext uri="{FF2B5EF4-FFF2-40B4-BE49-F238E27FC236}">
+                      <a16:creationId xmlns:a16="http://schemas.microsoft.com/office/drawing/2014/main" id="{6AEBA109-8990-4A5D-8AED-363364711345}"/>
+                    </a:ext>
+                  </a:extLst>
+                </p:cNvPr>
+                <p:cNvSpPr/>
+                <p:nvPr/>
+              </p:nvSpPr>
+              <p:spPr>
+                <a:xfrm>
+                  <a:off x="5530155" y="2859247"/>
+                  <a:ext cx="697761" cy="429238"/>
+                </a:xfrm>
+                <a:prstGeom prst="snip1Rect">
+                  <a:avLst/>
+                </a:prstGeom>
+                <a:solidFill>
+                  <a:schemeClr val="accent2">
+                    <a:alpha val="50000"/>
+                  </a:schemeClr>
+                </a:solidFill>
+                <a:ln>
+                  <a:noFill/>
+                </a:ln>
+              </p:spPr>
+              <p:style>
+                <a:lnRef idx="0">
+                  <a:scrgbClr r="0" g="0" b="0"/>
+                </a:lnRef>
+                <a:fillRef idx="0">
+                  <a:scrgbClr r="0" g="0" b="0"/>
+                </a:fillRef>
+                <a:effectRef idx="0">
+                  <a:scrgbClr r="0" g="0" b="0"/>
+                </a:effectRef>
+                <a:fontRef idx="minor">
+                  <a:schemeClr val="lt1"/>
+                </a:fontRef>
+              </p:style>
+              <p:txBody>
+                <a:bodyPr rtlCol="0" anchor="ctr"/>
+                <a:lstStyle/>
+                <a:p>
+                  <a:pPr algn="ctr"/>
+                  <a14:m>
+                    <m:oMathPara xmlns:m="http://schemas.openxmlformats.org/officeDocument/2006/math">
+                      <m:oMathParaPr>
+                        <m:jc m:val="centerGroup"/>
+                      </m:oMathParaPr>
+                      <m:oMath xmlns:m="http://schemas.openxmlformats.org/officeDocument/2006/math">
+                        <m:acc>
+                          <m:accPr>
+                            <m:chr m:val="̂"/>
+                            <m:ctrlPr>
+                              <a:rPr lang="en-US" sz="1400" i="1" smtClean="0">
+                                <a:solidFill>
+                                  <a:schemeClr val="tx1"/>
+                                </a:solidFill>
+                                <a:latin typeface="Cambria Math" panose="02040503050406030204" pitchFamily="18" charset="0"/>
+                              </a:rPr>
+                            </m:ctrlPr>
+                          </m:accPr>
+                          <m:e>
+                            <m:sSub>
+                              <m:sSubPr>
+                                <m:ctrlPr>
+                                  <a:rPr lang="el-GR" sz="1400" i="1" smtClean="0">
+                                    <a:solidFill>
+                                      <a:schemeClr val="tx1"/>
+                                    </a:solidFill>
+                                    <a:latin typeface="Cambria Math" panose="02040503050406030204" pitchFamily="18" charset="0"/>
+                                    <a:ea typeface="Cambria Math" panose="02040503050406030204" pitchFamily="18" charset="0"/>
+                                  </a:rPr>
+                                </m:ctrlPr>
+                              </m:sSubPr>
+                              <m:e>
+                                <m:r>
+                                  <m:rPr>
+                                    <m:sty m:val="p"/>
+                                  </m:rPr>
+                                  <a:rPr lang="el-GR" sz="1400" i="1">
+                                    <a:solidFill>
+                                      <a:schemeClr val="tx1"/>
+                                    </a:solidFill>
+                                    <a:latin typeface="Cambria Math" panose="02040503050406030204" pitchFamily="18" charset="0"/>
+                                    <a:ea typeface="Cambria Math" panose="02040503050406030204" pitchFamily="18" charset="0"/>
+                                  </a:rPr>
+                                  <m:t>Ω</m:t>
+                                </m:r>
+                              </m:e>
+                              <m:sub>
+                                <m:r>
+                                  <a:rPr lang="en-US" sz="1400" b="0" i="1" smtClean="0">
+                                    <a:solidFill>
+                                      <a:schemeClr val="tx1"/>
+                                    </a:solidFill>
+                                    <a:latin typeface="Cambria Math" panose="02040503050406030204" pitchFamily="18" charset="0"/>
+                                    <a:ea typeface="Cambria Math" panose="02040503050406030204" pitchFamily="18" charset="0"/>
+                                  </a:rPr>
+                                  <m:t>0</m:t>
+                                </m:r>
+                              </m:sub>
+                            </m:sSub>
+                          </m:e>
+                        </m:acc>
+                      </m:oMath>
+                    </m:oMathPara>
+                  </a14:m>
+                  <a:endParaRPr lang="en-US" sz="1400" dirty="0">
+                    <a:solidFill>
+                      <a:schemeClr val="tx1"/>
+                    </a:solidFill>
+                  </a:endParaRPr>
+                </a:p>
+                <a:p>
+                  <a:pPr algn="ctr"/>
+                  <a:r>
+                    <a:rPr lang="en-US" sz="800" i="1" dirty="0">
+                      <a:solidFill>
+                        <a:schemeClr val="tx1"/>
+                      </a:solidFill>
+                    </a:rPr>
+                    <a:t>Y-TVSOBI</a:t>
+                  </a:r>
+                </a:p>
+              </p:txBody>
+            </p:sp>
+          </mc:Choice>
+          <mc:Fallback>
+            <p:sp>
+              <p:nvSpPr>
+                <p:cNvPr id="26" name="Rectangle: Single Corner Snipped 25">
+                  <a:extLst>
+                    <a:ext uri="{FF2B5EF4-FFF2-40B4-BE49-F238E27FC236}">
+                      <a16:creationId xmlns:a16="http://schemas.microsoft.com/office/drawing/2014/main" id="{6AEBA109-8990-4A5D-8AED-363364711345}"/>
+                    </a:ext>
+                  </a:extLst>
+                </p:cNvPr>
+                <p:cNvSpPr>
+                  <a:spLocks noRot="1" noChangeAspect="1" noMove="1" noResize="1" noEditPoints="1" noAdjustHandles="1" noChangeArrowheads="1" noChangeShapeType="1" noTextEdit="1"/>
+                </p:cNvSpPr>
+                <p:nvPr/>
+              </p:nvSpPr>
+              <p:spPr>
+                <a:xfrm>
+                  <a:off x="5530155" y="2859247"/>
+                  <a:ext cx="697761" cy="429238"/>
+                </a:xfrm>
+                <a:prstGeom prst="snip1Rect">
+                  <a:avLst/>
+                </a:prstGeom>
+                <a:blipFill>
+                  <a:blip r:embed="rId6"/>
+                  <a:stretch>
+                    <a:fillRect r="-13043" b="-11429"/>
+                  </a:stretch>
+                </a:blipFill>
+                <a:ln>
+                  <a:noFill/>
+                </a:ln>
+              </p:spPr>
+              <p:txBody>
+                <a:bodyPr/>
+                <a:lstStyle/>
+                <a:p>
+                  <a:r>
+                    <a:rPr lang="en-US">
+                      <a:noFill/>
+                    </a:rPr>
+                    <a:t> </a:t>
+                  </a:r>
+                </a:p>
+              </p:txBody>
+            </p:sp>
+          </mc:Fallback>
+        </mc:AlternateContent>
+        <mc:AlternateContent xmlns:mc="http://schemas.openxmlformats.org/markup-compatibility/2006">
+          <mc:Choice xmlns:a14="http://schemas.microsoft.com/office/drawing/2010/main" Requires="a14">
+            <p:sp>
+              <p:nvSpPr>
+                <p:cNvPr id="27" name="Rectangle: Single Corner Snipped 26">
+                  <a:extLst>
+                    <a:ext uri="{FF2B5EF4-FFF2-40B4-BE49-F238E27FC236}">
+                      <a16:creationId xmlns:a16="http://schemas.microsoft.com/office/drawing/2014/main" id="{B4456E97-A7F7-4A82-97BE-986185E965D4}"/>
+                    </a:ext>
+                  </a:extLst>
+                </p:cNvPr>
+                <p:cNvSpPr/>
+                <p:nvPr/>
+              </p:nvSpPr>
+              <p:spPr>
+                <a:xfrm>
+                  <a:off x="5529663" y="3435134"/>
+                  <a:ext cx="697761" cy="429238"/>
+                </a:xfrm>
+                <a:prstGeom prst="snip1Rect">
+                  <a:avLst/>
+                </a:prstGeom>
+                <a:solidFill>
+                  <a:schemeClr val="accent2">
+                    <a:alpha val="50000"/>
+                  </a:schemeClr>
+                </a:solidFill>
+                <a:ln>
+                  <a:noFill/>
+                </a:ln>
+              </p:spPr>
+              <p:style>
+                <a:lnRef idx="0">
+                  <a:scrgbClr r="0" g="0" b="0"/>
+                </a:lnRef>
+                <a:fillRef idx="0">
+                  <a:scrgbClr r="0" g="0" b="0"/>
+                </a:fillRef>
+                <a:effectRef idx="0">
+                  <a:scrgbClr r="0" g="0" b="0"/>
+                </a:effectRef>
+                <a:fontRef idx="minor">
+                  <a:schemeClr val="lt1"/>
+                </a:fontRef>
+              </p:style>
+              <p:txBody>
+                <a:bodyPr rtlCol="0" anchor="ctr"/>
+                <a:lstStyle/>
+                <a:p>
+                  <a:pPr algn="ctr"/>
+                  <a14:m>
+                    <m:oMathPara xmlns:m="http://schemas.openxmlformats.org/officeDocument/2006/math">
+                      <m:oMathParaPr>
+                        <m:jc m:val="centerGroup"/>
+                      </m:oMathParaPr>
+                      <m:oMath xmlns:m="http://schemas.openxmlformats.org/officeDocument/2006/math">
+                        <m:acc>
+                          <m:accPr>
+                            <m:chr m:val="̂"/>
+                            <m:ctrlPr>
+                              <a:rPr lang="en-US" sz="1400" i="1" smtClean="0">
+                                <a:solidFill>
+                                  <a:schemeClr val="tx1"/>
+                                </a:solidFill>
+                                <a:latin typeface="Cambria Math" panose="02040503050406030204" pitchFamily="18" charset="0"/>
+                              </a:rPr>
+                            </m:ctrlPr>
+                          </m:accPr>
+                          <m:e>
+                            <m:r>
+                              <a:rPr lang="el-GR" sz="1400" i="1" smtClean="0">
+                                <a:solidFill>
+                                  <a:schemeClr val="tx1"/>
+                                </a:solidFill>
+                                <a:latin typeface="Cambria Math" panose="02040503050406030204" pitchFamily="18" charset="0"/>
+                                <a:ea typeface="Cambria Math" panose="02040503050406030204" pitchFamily="18" charset="0"/>
+                              </a:rPr>
+                              <m:t>𝜀</m:t>
+                            </m:r>
+                          </m:e>
+                        </m:acc>
+                      </m:oMath>
+                    </m:oMathPara>
+                  </a14:m>
+                  <a:endParaRPr lang="en-US" sz="1400" dirty="0">
+                    <a:solidFill>
+                      <a:schemeClr val="tx1"/>
+                    </a:solidFill>
+                  </a:endParaRPr>
+                </a:p>
+                <a:p>
+                  <a:pPr algn="ctr"/>
+                  <a:r>
+                    <a:rPr lang="en-US" sz="800" i="1" dirty="0">
+                      <a:solidFill>
+                        <a:schemeClr val="tx1"/>
+                      </a:solidFill>
+                    </a:rPr>
+                    <a:t>Y-TVSOBI</a:t>
+                  </a:r>
+                </a:p>
+              </p:txBody>
+            </p:sp>
+          </mc:Choice>
+          <mc:Fallback>
+            <p:sp>
+              <p:nvSpPr>
+                <p:cNvPr id="27" name="Rectangle: Single Corner Snipped 26">
+                  <a:extLst>
+                    <a:ext uri="{FF2B5EF4-FFF2-40B4-BE49-F238E27FC236}">
+                      <a16:creationId xmlns:a16="http://schemas.microsoft.com/office/drawing/2014/main" id="{B4456E97-A7F7-4A82-97BE-986185E965D4}"/>
+                    </a:ext>
+                  </a:extLst>
+                </p:cNvPr>
+                <p:cNvSpPr>
+                  <a:spLocks noRot="1" noChangeAspect="1" noMove="1" noResize="1" noEditPoints="1" noAdjustHandles="1" noChangeArrowheads="1" noChangeShapeType="1" noTextEdit="1"/>
+                </p:cNvSpPr>
+                <p:nvPr/>
+              </p:nvSpPr>
+              <p:spPr>
+                <a:xfrm>
+                  <a:off x="5529663" y="3435134"/>
+                  <a:ext cx="697761" cy="429238"/>
+                </a:xfrm>
+                <a:prstGeom prst="snip1Rect">
+                  <a:avLst/>
+                </a:prstGeom>
+                <a:blipFill>
+                  <a:blip r:embed="rId7"/>
+                  <a:stretch>
+                    <a:fillRect b="-10000"/>
+                  </a:stretch>
+                </a:blipFill>
+                <a:ln>
+                  <a:noFill/>
+                </a:ln>
+              </p:spPr>
+              <p:txBody>
+                <a:bodyPr/>
+                <a:lstStyle/>
+                <a:p>
+                  <a:r>
+                    <a:rPr lang="en-US">
+                      <a:noFill/>
+                    </a:rPr>
+                    <a:t> </a:t>
+                  </a:r>
+                </a:p>
+              </p:txBody>
+            </p:sp>
+          </mc:Fallback>
+        </mc:AlternateContent>
+        <mc:AlternateContent xmlns:mc="http://schemas.openxmlformats.org/markup-compatibility/2006">
+          <mc:Choice xmlns:a14="http://schemas.microsoft.com/office/drawing/2010/main" Requires="a14">
+            <p:sp>
+              <p:nvSpPr>
+                <p:cNvPr id="28" name="Rectangle: Single Corner Snipped 27">
+                  <a:extLst>
+                    <a:ext uri="{FF2B5EF4-FFF2-40B4-BE49-F238E27FC236}">
+                      <a16:creationId xmlns:a16="http://schemas.microsoft.com/office/drawing/2014/main" id="{3E37FCA4-FC69-4C87-B80D-39490E9CB9CB}"/>
+                    </a:ext>
+                  </a:extLst>
+                </p:cNvPr>
+                <p:cNvSpPr/>
+                <p:nvPr/>
+              </p:nvSpPr>
+              <p:spPr>
+                <a:xfrm>
+                  <a:off x="6825038" y="2834080"/>
+                  <a:ext cx="697761" cy="429238"/>
+                </a:xfrm>
+                <a:prstGeom prst="snip1Rect">
+                  <a:avLst/>
+                </a:prstGeom>
+                <a:solidFill>
+                  <a:schemeClr val="accent6">
+                    <a:alpha val="50000"/>
+                  </a:schemeClr>
+                </a:solidFill>
+                <a:ln>
+                  <a:noFill/>
+                </a:ln>
+              </p:spPr>
+              <p:style>
+                <a:lnRef idx="0">
+                  <a:scrgbClr r="0" g="0" b="0"/>
+                </a:lnRef>
+                <a:fillRef idx="0">
+                  <a:scrgbClr r="0" g="0" b="0"/>
+                </a:fillRef>
+                <a:effectRef idx="0">
+                  <a:scrgbClr r="0" g="0" b="0"/>
+                </a:effectRef>
+                <a:fontRef idx="minor">
+                  <a:schemeClr val="lt1"/>
+                </a:fontRef>
+              </p:style>
+              <p:txBody>
+                <a:bodyPr rtlCol="0" anchor="ctr"/>
+                <a:lstStyle/>
+                <a:p>
+                  <a:pPr algn="ctr"/>
+                  <a14:m>
+                    <m:oMathPara xmlns:m="http://schemas.openxmlformats.org/officeDocument/2006/math">
+                      <m:oMathParaPr>
+                        <m:jc m:val="centerGroup"/>
+                      </m:oMathParaPr>
+                      <m:oMath xmlns:m="http://schemas.openxmlformats.org/officeDocument/2006/math">
+                        <m:acc>
+                          <m:accPr>
+                            <m:chr m:val="̂"/>
+                            <m:ctrlPr>
+                              <a:rPr lang="en-US" sz="1400" i="1" smtClean="0">
+                                <a:solidFill>
+                                  <a:schemeClr val="tx1"/>
+                                </a:solidFill>
+                                <a:latin typeface="Cambria Math" panose="02040503050406030204" pitchFamily="18" charset="0"/>
+                              </a:rPr>
+                            </m:ctrlPr>
+                          </m:accPr>
+                          <m:e>
+                            <m:sSub>
+                              <m:sSubPr>
+                                <m:ctrlPr>
+                                  <a:rPr lang="el-GR" sz="1400" i="1" smtClean="0">
+                                    <a:solidFill>
+                                      <a:schemeClr val="tx1"/>
+                                    </a:solidFill>
+                                    <a:latin typeface="Cambria Math" panose="02040503050406030204" pitchFamily="18" charset="0"/>
+                                    <a:ea typeface="Cambria Math" panose="02040503050406030204" pitchFamily="18" charset="0"/>
+                                  </a:rPr>
+                                </m:ctrlPr>
+                              </m:sSubPr>
+                              <m:e>
+                                <m:r>
+                                  <m:rPr>
+                                    <m:sty m:val="p"/>
+                                  </m:rPr>
+                                  <a:rPr lang="el-GR" sz="1400" i="1">
+                                    <a:solidFill>
+                                      <a:schemeClr val="tx1"/>
+                                    </a:solidFill>
+                                    <a:latin typeface="Cambria Math" panose="02040503050406030204" pitchFamily="18" charset="0"/>
+                                    <a:ea typeface="Cambria Math" panose="02040503050406030204" pitchFamily="18" charset="0"/>
+                                  </a:rPr>
+                                  <m:t>Ω</m:t>
+                                </m:r>
+                              </m:e>
+                              <m:sub>
+                                <m:r>
+                                  <a:rPr lang="en-US" sz="1400" b="0" i="1" smtClean="0">
+                                    <a:solidFill>
+                                      <a:schemeClr val="tx1"/>
+                                    </a:solidFill>
+                                    <a:latin typeface="Cambria Math" panose="02040503050406030204" pitchFamily="18" charset="0"/>
+                                    <a:ea typeface="Cambria Math" panose="02040503050406030204" pitchFamily="18" charset="0"/>
+                                  </a:rPr>
+                                  <m:t>0</m:t>
+                                </m:r>
+                              </m:sub>
+                            </m:sSub>
+                          </m:e>
+                        </m:acc>
+                      </m:oMath>
+                    </m:oMathPara>
+                  </a14:m>
+                  <a:endParaRPr lang="en-US" sz="1400" dirty="0">
+                    <a:solidFill>
+                      <a:schemeClr val="tx1"/>
+                    </a:solidFill>
+                  </a:endParaRPr>
+                </a:p>
+                <a:p>
+                  <a:pPr algn="ctr"/>
+                  <a:r>
+                    <a:rPr lang="en-US" sz="800" i="1" dirty="0">
+                      <a:solidFill>
+                        <a:schemeClr val="tx1"/>
+                      </a:solidFill>
+                    </a:rPr>
+                    <a:t>LTV-SOBI</a:t>
+                  </a:r>
+                </a:p>
+              </p:txBody>
+            </p:sp>
+          </mc:Choice>
+          <mc:Fallback>
+            <p:sp>
+              <p:nvSpPr>
+                <p:cNvPr id="28" name="Rectangle: Single Corner Snipped 27">
+                  <a:extLst>
+                    <a:ext uri="{FF2B5EF4-FFF2-40B4-BE49-F238E27FC236}">
+                      <a16:creationId xmlns:a16="http://schemas.microsoft.com/office/drawing/2014/main" id="{3E37FCA4-FC69-4C87-B80D-39490E9CB9CB}"/>
+                    </a:ext>
+                  </a:extLst>
+                </p:cNvPr>
+                <p:cNvSpPr>
+                  <a:spLocks noRot="1" noChangeAspect="1" noMove="1" noResize="1" noEditPoints="1" noAdjustHandles="1" noChangeArrowheads="1" noChangeShapeType="1" noTextEdit="1"/>
+                </p:cNvSpPr>
+                <p:nvPr/>
+              </p:nvSpPr>
+              <p:spPr>
+                <a:xfrm>
+                  <a:off x="6825038" y="2834080"/>
+                  <a:ext cx="697761" cy="429238"/>
+                </a:xfrm>
+                <a:prstGeom prst="snip1Rect">
+                  <a:avLst/>
+                </a:prstGeom>
+                <a:blipFill>
+                  <a:blip r:embed="rId8"/>
+                  <a:stretch>
+                    <a:fillRect r="-13158" b="-10000"/>
+                  </a:stretch>
+                </a:blipFill>
+                <a:ln>
+                  <a:noFill/>
+                </a:ln>
+              </p:spPr>
+              <p:txBody>
+                <a:bodyPr/>
+                <a:lstStyle/>
+                <a:p>
+                  <a:r>
+                    <a:rPr lang="en-US">
+                      <a:noFill/>
+                    </a:rPr>
+                    <a:t> </a:t>
+                  </a:r>
+                </a:p>
+              </p:txBody>
+            </p:sp>
+          </mc:Fallback>
+        </mc:AlternateContent>
+        <mc:AlternateContent xmlns:mc="http://schemas.openxmlformats.org/markup-compatibility/2006">
+          <mc:Choice xmlns:a14="http://schemas.microsoft.com/office/drawing/2010/main" Requires="a14">
+            <p:sp>
+              <p:nvSpPr>
+                <p:cNvPr id="29" name="Rectangle: Single Corner Snipped 28">
+                  <a:extLst>
+                    <a:ext uri="{FF2B5EF4-FFF2-40B4-BE49-F238E27FC236}">
+                      <a16:creationId xmlns:a16="http://schemas.microsoft.com/office/drawing/2014/main" id="{79F8BA64-4709-4DD7-9617-901033AC51E5}"/>
+                    </a:ext>
+                  </a:extLst>
+                </p:cNvPr>
+                <p:cNvSpPr/>
+                <p:nvPr/>
+              </p:nvSpPr>
+              <p:spPr>
+                <a:xfrm>
+                  <a:off x="6825038" y="3437773"/>
+                  <a:ext cx="697761" cy="429238"/>
+                </a:xfrm>
+                <a:prstGeom prst="snip1Rect">
+                  <a:avLst/>
+                </a:prstGeom>
+                <a:solidFill>
+                  <a:schemeClr val="accent6">
+                    <a:alpha val="50000"/>
+                  </a:schemeClr>
+                </a:solidFill>
+                <a:ln>
+                  <a:noFill/>
+                </a:ln>
+              </p:spPr>
+              <p:style>
+                <a:lnRef idx="0">
+                  <a:scrgbClr r="0" g="0" b="0"/>
+                </a:lnRef>
+                <a:fillRef idx="0">
+                  <a:scrgbClr r="0" g="0" b="0"/>
+                </a:fillRef>
+                <a:effectRef idx="0">
+                  <a:scrgbClr r="0" g="0" b="0"/>
+                </a:effectRef>
+                <a:fontRef idx="minor">
+                  <a:schemeClr val="lt1"/>
+                </a:fontRef>
+              </p:style>
+              <p:txBody>
+                <a:bodyPr rtlCol="0" anchor="ctr"/>
+                <a:lstStyle/>
+                <a:p>
+                  <a:pPr algn="ctr"/>
+                  <a14:m>
+                    <m:oMathPara xmlns:m="http://schemas.openxmlformats.org/officeDocument/2006/math">
+                      <m:oMathParaPr>
+                        <m:jc m:val="centerGroup"/>
+                      </m:oMathParaPr>
+                      <m:oMath xmlns:m="http://schemas.openxmlformats.org/officeDocument/2006/math">
+                        <m:acc>
+                          <m:accPr>
+                            <m:chr m:val="̂"/>
+                            <m:ctrlPr>
+                              <a:rPr lang="en-US" sz="1400" i="1" smtClean="0">
+                                <a:solidFill>
+                                  <a:schemeClr val="tx1"/>
+                                </a:solidFill>
+                                <a:latin typeface="Cambria Math" panose="02040503050406030204" pitchFamily="18" charset="0"/>
+                              </a:rPr>
+                            </m:ctrlPr>
+                          </m:accPr>
+                          <m:e>
+                            <m:r>
+                              <a:rPr lang="el-GR" sz="1400" i="1" smtClean="0">
+                                <a:solidFill>
+                                  <a:schemeClr val="tx1"/>
+                                </a:solidFill>
+                                <a:latin typeface="Cambria Math" panose="02040503050406030204" pitchFamily="18" charset="0"/>
+                                <a:ea typeface="Cambria Math" panose="02040503050406030204" pitchFamily="18" charset="0"/>
+                              </a:rPr>
+                              <m:t>𝜀</m:t>
+                            </m:r>
+                          </m:e>
+                        </m:acc>
+                      </m:oMath>
+                    </m:oMathPara>
+                  </a14:m>
+                  <a:endParaRPr lang="en-US" sz="1400" dirty="0">
+                    <a:solidFill>
+                      <a:schemeClr val="tx1"/>
+                    </a:solidFill>
+                  </a:endParaRPr>
+                </a:p>
+                <a:p>
+                  <a:pPr algn="ctr"/>
+                  <a:r>
+                    <a:rPr lang="en-US" sz="800" i="1" dirty="0">
+                      <a:solidFill>
+                        <a:schemeClr val="tx1"/>
+                      </a:solidFill>
+                    </a:rPr>
+                    <a:t>LTV-SOBI</a:t>
+                  </a:r>
+                </a:p>
+              </p:txBody>
+            </p:sp>
+          </mc:Choice>
+          <mc:Fallback>
+            <p:sp>
+              <p:nvSpPr>
+                <p:cNvPr id="29" name="Rectangle: Single Corner Snipped 28">
+                  <a:extLst>
+                    <a:ext uri="{FF2B5EF4-FFF2-40B4-BE49-F238E27FC236}">
+                      <a16:creationId xmlns:a16="http://schemas.microsoft.com/office/drawing/2014/main" id="{79F8BA64-4709-4DD7-9617-901033AC51E5}"/>
+                    </a:ext>
+                  </a:extLst>
+                </p:cNvPr>
+                <p:cNvSpPr>
+                  <a:spLocks noRot="1" noChangeAspect="1" noMove="1" noResize="1" noEditPoints="1" noAdjustHandles="1" noChangeArrowheads="1" noChangeShapeType="1" noTextEdit="1"/>
+                </p:cNvSpPr>
+                <p:nvPr/>
+              </p:nvSpPr>
+              <p:spPr>
+                <a:xfrm>
+                  <a:off x="6825038" y="3437773"/>
+                  <a:ext cx="697761" cy="429238"/>
+                </a:xfrm>
+                <a:prstGeom prst="snip1Rect">
+                  <a:avLst/>
+                </a:prstGeom>
+                <a:blipFill>
+                  <a:blip r:embed="rId9"/>
+                  <a:stretch>
+                    <a:fillRect b="-10000"/>
+                  </a:stretch>
+                </a:blipFill>
+                <a:ln>
+                  <a:noFill/>
+                </a:ln>
+              </p:spPr>
+              <p:txBody>
+                <a:bodyPr/>
+                <a:lstStyle/>
+                <a:p>
+                  <a:r>
+                    <a:rPr lang="en-US">
+                      <a:noFill/>
+                    </a:rPr>
+                    <a:t> </a:t>
+                  </a:r>
+                </a:p>
+              </p:txBody>
+            </p:sp>
+          </mc:Fallback>
+        </mc:AlternateContent>
+        <mc:AlternateContent xmlns:mc="http://schemas.openxmlformats.org/markup-compatibility/2006">
+          <mc:Choice xmlns:a14="http://schemas.microsoft.com/office/drawing/2010/main" Requires="a14">
+            <p:sp>
+              <p:nvSpPr>
+                <p:cNvPr id="30" name="Rectangle: Single Corner Snipped 29">
+                  <a:extLst>
+                    <a:ext uri="{FF2B5EF4-FFF2-40B4-BE49-F238E27FC236}">
+                      <a16:creationId xmlns:a16="http://schemas.microsoft.com/office/drawing/2014/main" id="{5D6E84B7-7F64-415A-9883-7A0B32B05A4E}"/>
+                    </a:ext>
+                  </a:extLst>
+                </p:cNvPr>
+                <p:cNvSpPr/>
+                <p:nvPr/>
+              </p:nvSpPr>
+              <p:spPr>
+                <a:xfrm>
+                  <a:off x="7898895" y="3450815"/>
+                  <a:ext cx="818788" cy="429238"/>
+                </a:xfrm>
+                <a:prstGeom prst="snip1Rect">
+                  <a:avLst/>
+                </a:prstGeom>
+                <a:solidFill>
+                  <a:schemeClr val="accent4">
+                    <a:alpha val="50000"/>
+                  </a:schemeClr>
+                </a:solidFill>
+                <a:ln>
+                  <a:noFill/>
+                </a:ln>
+              </p:spPr>
+              <p:style>
+                <a:lnRef idx="0">
+                  <a:scrgbClr r="0" g="0" b="0"/>
+                </a:lnRef>
+                <a:fillRef idx="0">
+                  <a:scrgbClr r="0" g="0" b="0"/>
+                </a:fillRef>
+                <a:effectRef idx="0">
+                  <a:scrgbClr r="0" g="0" b="0"/>
+                </a:effectRef>
+                <a:fontRef idx="minor">
+                  <a:schemeClr val="lt1"/>
+                </a:fontRef>
+              </p:style>
+              <p:txBody>
+                <a:bodyPr rtlCol="0" anchor="ctr"/>
+                <a:lstStyle/>
+                <a:p>
+                  <a:pPr algn="ctr"/>
+                  <a14:m>
+                    <m:oMathPara xmlns:m="http://schemas.openxmlformats.org/officeDocument/2006/math">
+                      <m:oMathParaPr>
+                        <m:jc m:val="centerGroup"/>
+                      </m:oMathParaPr>
+                      <m:oMath xmlns:m="http://schemas.openxmlformats.org/officeDocument/2006/math">
+                        <m:acc>
+                          <m:accPr>
+                            <m:chr m:val="̂"/>
+                            <m:ctrlPr>
+                              <a:rPr lang="en-US" sz="1400" i="1" smtClean="0">
+                                <a:solidFill>
+                                  <a:schemeClr val="tx1"/>
+                                </a:solidFill>
+                                <a:latin typeface="Cambria Math" panose="02040503050406030204" pitchFamily="18" charset="0"/>
+                              </a:rPr>
+                            </m:ctrlPr>
+                          </m:accPr>
+                          <m:e>
+                            <m:sSub>
+                              <m:sSubPr>
+                                <m:ctrlPr>
+                                  <a:rPr lang="el-GR" sz="1400" i="1" smtClean="0">
+                                    <a:solidFill>
+                                      <a:schemeClr val="tx1"/>
+                                    </a:solidFill>
+                                    <a:latin typeface="Cambria Math" panose="02040503050406030204" pitchFamily="18" charset="0"/>
+                                    <a:ea typeface="Cambria Math" panose="02040503050406030204" pitchFamily="18" charset="0"/>
+                                  </a:rPr>
+                                </m:ctrlPr>
+                              </m:sSubPr>
+                              <m:e>
+                                <m:r>
+                                  <m:rPr>
+                                    <m:sty m:val="p"/>
+                                  </m:rPr>
+                                  <a:rPr lang="el-GR" sz="1400" i="1">
+                                    <a:solidFill>
+                                      <a:schemeClr val="tx1"/>
+                                    </a:solidFill>
+                                    <a:latin typeface="Cambria Math" panose="02040503050406030204" pitchFamily="18" charset="0"/>
+                                    <a:ea typeface="Cambria Math" panose="02040503050406030204" pitchFamily="18" charset="0"/>
+                                  </a:rPr>
+                                  <m:t>Ω</m:t>
+                                </m:r>
+                              </m:e>
+                              <m:sub>
+                                <m:r>
+                                  <a:rPr lang="en-US" sz="1400" b="0" i="1" smtClean="0">
+                                    <a:solidFill>
+                                      <a:schemeClr val="tx1"/>
+                                    </a:solidFill>
+                                    <a:latin typeface="Cambria Math" panose="02040503050406030204" pitchFamily="18" charset="0"/>
+                                    <a:ea typeface="Cambria Math" panose="02040503050406030204" pitchFamily="18" charset="0"/>
+                                  </a:rPr>
+                                  <m:t>0</m:t>
+                                </m:r>
+                              </m:sub>
+                            </m:sSub>
+                          </m:e>
+                        </m:acc>
+                      </m:oMath>
+                    </m:oMathPara>
+                  </a14:m>
+                  <a:endParaRPr lang="en-US" sz="1400" dirty="0">
+                    <a:solidFill>
+                      <a:schemeClr val="tx1"/>
+                    </a:solidFill>
+                  </a:endParaRPr>
+                </a:p>
+                <a:p>
+                  <a:pPr algn="ctr"/>
+                  <a:r>
+                    <a:rPr lang="en-US" sz="800" i="1" dirty="0">
+                      <a:solidFill>
+                        <a:schemeClr val="tx1"/>
+                      </a:solidFill>
+                    </a:rPr>
+                    <a:t>LTV-SOBI-alt</a:t>
+                  </a:r>
+                </a:p>
+              </p:txBody>
+            </p:sp>
+          </mc:Choice>
+          <mc:Fallback>
+            <p:sp>
+              <p:nvSpPr>
+                <p:cNvPr id="30" name="Rectangle: Single Corner Snipped 29">
+                  <a:extLst>
+                    <a:ext uri="{FF2B5EF4-FFF2-40B4-BE49-F238E27FC236}">
+                      <a16:creationId xmlns:a16="http://schemas.microsoft.com/office/drawing/2014/main" id="{5D6E84B7-7F64-415A-9883-7A0B32B05A4E}"/>
+                    </a:ext>
+                  </a:extLst>
+                </p:cNvPr>
+                <p:cNvSpPr>
+                  <a:spLocks noRot="1" noChangeAspect="1" noMove="1" noResize="1" noEditPoints="1" noAdjustHandles="1" noChangeArrowheads="1" noChangeShapeType="1" noTextEdit="1"/>
+                </p:cNvSpPr>
+                <p:nvPr/>
+              </p:nvSpPr>
+              <p:spPr>
+                <a:xfrm>
+                  <a:off x="7898895" y="3450815"/>
+                  <a:ext cx="818788" cy="429238"/>
+                </a:xfrm>
+                <a:prstGeom prst="snip1Rect">
+                  <a:avLst/>
+                </a:prstGeom>
+                <a:blipFill>
+                  <a:blip r:embed="rId10"/>
+                  <a:stretch>
+                    <a:fillRect r="-18657" b="-11429"/>
+                  </a:stretch>
+                </a:blipFill>
+                <a:ln>
+                  <a:noFill/>
+                </a:ln>
+              </p:spPr>
+              <p:txBody>
+                <a:bodyPr/>
+                <a:lstStyle/>
+                <a:p>
+                  <a:r>
+                    <a:rPr lang="en-US">
+                      <a:noFill/>
+                    </a:rPr>
+                    <a:t> </a:t>
+                  </a:r>
+                </a:p>
+              </p:txBody>
+            </p:sp>
+          </mc:Fallback>
+        </mc:AlternateContent>
+        <mc:AlternateContent xmlns:mc="http://schemas.openxmlformats.org/markup-compatibility/2006">
+          <mc:Choice xmlns:a14="http://schemas.microsoft.com/office/drawing/2010/main" Requires="a14">
+            <p:sp>
+              <p:nvSpPr>
+                <p:cNvPr id="32" name="Rectangle: Single Corner Snipped 31">
+                  <a:extLst>
+                    <a:ext uri="{FF2B5EF4-FFF2-40B4-BE49-F238E27FC236}">
+                      <a16:creationId xmlns:a16="http://schemas.microsoft.com/office/drawing/2014/main" id="{377AE659-882C-40D1-9E08-7EABF7182929}"/>
+                    </a:ext>
+                  </a:extLst>
+                </p:cNvPr>
+                <p:cNvSpPr/>
+                <p:nvPr/>
+              </p:nvSpPr>
+              <p:spPr>
+                <a:xfrm>
+                  <a:off x="8356409" y="2880063"/>
+                  <a:ext cx="818788" cy="429238"/>
+                </a:xfrm>
+                <a:prstGeom prst="snip1Rect">
+                  <a:avLst/>
+                </a:prstGeom>
+                <a:solidFill>
+                  <a:schemeClr val="accent4">
+                    <a:alpha val="50000"/>
+                  </a:schemeClr>
+                </a:solidFill>
+                <a:ln>
+                  <a:noFill/>
+                </a:ln>
+              </p:spPr>
+              <p:style>
+                <a:lnRef idx="0">
+                  <a:scrgbClr r="0" g="0" b="0"/>
+                </a:lnRef>
+                <a:fillRef idx="0">
+                  <a:scrgbClr r="0" g="0" b="0"/>
+                </a:fillRef>
+                <a:effectRef idx="0">
+                  <a:scrgbClr r="0" g="0" b="0"/>
+                </a:effectRef>
+                <a:fontRef idx="minor">
+                  <a:schemeClr val="lt1"/>
+                </a:fontRef>
+              </p:style>
+              <p:txBody>
+                <a:bodyPr rtlCol="0" anchor="ctr"/>
+                <a:lstStyle/>
+                <a:p>
+                  <a:pPr algn="ctr"/>
+                  <a14:m>
+                    <m:oMathPara xmlns:m="http://schemas.openxmlformats.org/officeDocument/2006/math">
+                      <m:oMathParaPr>
+                        <m:jc m:val="centerGroup"/>
+                      </m:oMathParaPr>
+                      <m:oMath xmlns:m="http://schemas.openxmlformats.org/officeDocument/2006/math">
+                        <m:r>
+                          <a:rPr lang="en-US" sz="1400" b="0" i="1" smtClean="0">
+                            <a:solidFill>
+                              <a:schemeClr val="tx1"/>
+                            </a:solidFill>
+                            <a:latin typeface="Cambria Math" panose="02040503050406030204" pitchFamily="18" charset="0"/>
+                          </a:rPr>
+                          <m:t>(</m:t>
+                        </m:r>
+                        <m:acc>
+                          <m:accPr>
+                            <m:chr m:val="̂"/>
+                            <m:ctrlPr>
+                              <a:rPr lang="en-US" sz="1400" i="1" smtClean="0">
+                                <a:solidFill>
+                                  <a:schemeClr val="tx1"/>
+                                </a:solidFill>
+                                <a:latin typeface="Cambria Math" panose="02040503050406030204" pitchFamily="18" charset="0"/>
+                              </a:rPr>
+                            </m:ctrlPr>
+                          </m:accPr>
+                          <m:e>
+                            <m:sSub>
+                              <m:sSubPr>
+                                <m:ctrlPr>
+                                  <a:rPr lang="el-GR" sz="1400" i="1" smtClean="0">
+                                    <a:solidFill>
+                                      <a:schemeClr val="tx1"/>
+                                    </a:solidFill>
+                                    <a:latin typeface="Cambria Math" panose="02040503050406030204" pitchFamily="18" charset="0"/>
+                                    <a:ea typeface="Cambria Math" panose="02040503050406030204" pitchFamily="18" charset="0"/>
+                                  </a:rPr>
+                                </m:ctrlPr>
+                              </m:sSubPr>
+                              <m:e>
+                                <m:r>
+                                  <m:rPr>
+                                    <m:sty m:val="p"/>
+                                  </m:rPr>
+                                  <a:rPr lang="el-GR" sz="1400" i="1">
+                                    <a:solidFill>
+                                      <a:schemeClr val="tx1"/>
+                                    </a:solidFill>
+                                    <a:latin typeface="Cambria Math" panose="02040503050406030204" pitchFamily="18" charset="0"/>
+                                    <a:ea typeface="Cambria Math" panose="02040503050406030204" pitchFamily="18" charset="0"/>
+                                  </a:rPr>
+                                  <m:t>Ω</m:t>
+                                </m:r>
+                              </m:e>
+                              <m:sub>
+                                <m:r>
+                                  <a:rPr lang="en-US" sz="1400" b="0" i="1" smtClean="0">
+                                    <a:solidFill>
+                                      <a:schemeClr val="tx1"/>
+                                    </a:solidFill>
+                                    <a:latin typeface="Cambria Math" panose="02040503050406030204" pitchFamily="18" charset="0"/>
+                                    <a:ea typeface="Cambria Math" panose="02040503050406030204" pitchFamily="18" charset="0"/>
+                                  </a:rPr>
+                                  <m:t>0</m:t>
+                                </m:r>
+                              </m:sub>
+                            </m:sSub>
+                            <m:r>
+                              <a:rPr lang="el-GR" sz="1400" i="1" smtClean="0">
+                                <a:solidFill>
+                                  <a:schemeClr val="tx1"/>
+                                </a:solidFill>
+                                <a:latin typeface="Cambria Math" panose="02040503050406030204" pitchFamily="18" charset="0"/>
+                                <a:ea typeface="Cambria Math" panose="02040503050406030204" pitchFamily="18" charset="0"/>
+                              </a:rPr>
+                              <m:t>𝜀</m:t>
+                            </m:r>
+                          </m:e>
+                        </m:acc>
+                        <m:r>
+                          <a:rPr lang="en-US" sz="1400" b="0" i="1" smtClean="0">
+                            <a:solidFill>
+                              <a:schemeClr val="tx1"/>
+                            </a:solidFill>
+                            <a:latin typeface="Cambria Math" panose="02040503050406030204" pitchFamily="18" charset="0"/>
+                          </a:rPr>
+                          <m:t>)</m:t>
+                        </m:r>
+                      </m:oMath>
+                    </m:oMathPara>
+                  </a14:m>
+                  <a:endParaRPr lang="en-US" sz="1400" dirty="0">
+                    <a:solidFill>
+                      <a:schemeClr val="tx1"/>
+                    </a:solidFill>
+                  </a:endParaRPr>
+                </a:p>
+                <a:p>
+                  <a:pPr algn="ctr"/>
+                  <a:r>
+                    <a:rPr lang="en-US" sz="800" i="1" dirty="0">
+                      <a:solidFill>
+                        <a:schemeClr val="tx1"/>
+                      </a:solidFill>
+                    </a:rPr>
+                    <a:t>LTV-SOBI-alt</a:t>
+                  </a:r>
+                </a:p>
+              </p:txBody>
+            </p:sp>
+          </mc:Choice>
+          <mc:Fallback>
+            <p:sp>
+              <p:nvSpPr>
+                <p:cNvPr id="32" name="Rectangle: Single Corner Snipped 31">
+                  <a:extLst>
+                    <a:ext uri="{FF2B5EF4-FFF2-40B4-BE49-F238E27FC236}">
+                      <a16:creationId xmlns:a16="http://schemas.microsoft.com/office/drawing/2014/main" id="{377AE659-882C-40D1-9E08-7EABF7182929}"/>
+                    </a:ext>
+                  </a:extLst>
+                </p:cNvPr>
+                <p:cNvSpPr>
+                  <a:spLocks noRot="1" noChangeAspect="1" noMove="1" noResize="1" noEditPoints="1" noAdjustHandles="1" noChangeArrowheads="1" noChangeShapeType="1" noTextEdit="1"/>
+                </p:cNvSpPr>
+                <p:nvPr/>
+              </p:nvSpPr>
+              <p:spPr>
+                <a:xfrm>
+                  <a:off x="8356409" y="2880063"/>
+                  <a:ext cx="818788" cy="429238"/>
+                </a:xfrm>
+                <a:prstGeom prst="snip1Rect">
+                  <a:avLst/>
+                </a:prstGeom>
+                <a:blipFill>
+                  <a:blip r:embed="rId11"/>
+                  <a:stretch>
+                    <a:fillRect r="-18657" b="-9859"/>
+                  </a:stretch>
+                </a:blipFill>
+                <a:ln>
+                  <a:noFill/>
+                </a:ln>
+              </p:spPr>
+              <p:txBody>
+                <a:bodyPr/>
+                <a:lstStyle/>
+                <a:p>
+                  <a:r>
+                    <a:rPr lang="en-US">
+                      <a:noFill/>
+                    </a:rPr>
+                    <a:t> </a:t>
+                  </a:r>
+                </a:p>
+              </p:txBody>
+            </p:sp>
+          </mc:Fallback>
+        </mc:AlternateContent>
+        <p:cxnSp>
+          <p:nvCxnSpPr>
+            <p:cNvPr id="39" name="Straight Arrow Connector 38">
+              <a:extLst>
+                <a:ext uri="{FF2B5EF4-FFF2-40B4-BE49-F238E27FC236}">
+                  <a16:creationId xmlns:a16="http://schemas.microsoft.com/office/drawing/2014/main" id="{ADBA2818-BAFF-45AC-AC89-5A2BE714F05F}"/>
+                </a:ext>
+              </a:extLst>
+            </p:cNvPr>
+            <p:cNvCxnSpPr>
+              <a:cxnSpLocks/>
+              <a:stCxn id="15" idx="2"/>
+              <a:endCxn id="27" idx="0"/>
+            </p:cNvCxnSpPr>
+            <p:nvPr/>
+          </p:nvCxnSpPr>
+          <p:spPr>
+            <a:xfrm flipH="1">
+              <a:off x="6227424" y="2427214"/>
+              <a:ext cx="849256" cy="1222539"/>
+            </a:xfrm>
+            <a:prstGeom prst="straightConnector1">
+              <a:avLst/>
+            </a:prstGeom>
+            <a:ln>
+              <a:tailEnd type="triangle"/>
+            </a:ln>
+          </p:spPr>
+          <p:style>
+            <a:lnRef idx="1">
+              <a:schemeClr val="accent2"/>
+            </a:lnRef>
+            <a:fillRef idx="0">
+              <a:schemeClr val="accent2"/>
+            </a:fillRef>
+            <a:effectRef idx="0">
+              <a:schemeClr val="accent2"/>
+            </a:effectRef>
+            <a:fontRef idx="minor">
+              <a:schemeClr val="tx1"/>
+            </a:fontRef>
+          </p:style>
+        </p:cxnSp>
+        <p:cxnSp>
+          <p:nvCxnSpPr>
+            <p:cNvPr id="47" name="Connector: Elbow 46">
+              <a:extLst>
+                <a:ext uri="{FF2B5EF4-FFF2-40B4-BE49-F238E27FC236}">
+                  <a16:creationId xmlns:a16="http://schemas.microsoft.com/office/drawing/2014/main" id="{B0CC66B8-427A-47C6-AFD0-F2EE29EF92ED}"/>
+                </a:ext>
+              </a:extLst>
+            </p:cNvPr>
+            <p:cNvCxnSpPr>
+              <a:cxnSpLocks/>
+              <a:stCxn id="14" idx="2"/>
+              <a:endCxn id="26" idx="3"/>
+            </p:cNvCxnSpPr>
+            <p:nvPr/>
+          </p:nvCxnSpPr>
+          <p:spPr>
+            <a:xfrm rot="10800000" flipV="1">
+              <a:off x="5879036" y="2427213"/>
+              <a:ext cx="314758" cy="432033"/>
+            </a:xfrm>
+            <a:prstGeom prst="bentConnector2">
+              <a:avLst/>
+            </a:prstGeom>
+            <a:ln>
+              <a:tailEnd type="triangle"/>
+            </a:ln>
+          </p:spPr>
+          <p:style>
+            <a:lnRef idx="1">
+              <a:schemeClr val="accent2"/>
+            </a:lnRef>
+            <a:fillRef idx="0">
+              <a:schemeClr val="accent2"/>
+            </a:fillRef>
+            <a:effectRef idx="0">
+              <a:schemeClr val="accent2"/>
+            </a:effectRef>
+            <a:fontRef idx="minor">
+              <a:schemeClr val="tx1"/>
+            </a:fontRef>
+          </p:style>
+        </p:cxnSp>
+        <p:cxnSp>
+          <p:nvCxnSpPr>
+            <p:cNvPr id="59" name="Connector: Elbow 58">
+              <a:extLst>
+                <a:ext uri="{FF2B5EF4-FFF2-40B4-BE49-F238E27FC236}">
+                  <a16:creationId xmlns:a16="http://schemas.microsoft.com/office/drawing/2014/main" id="{EB829FB9-4420-4F96-9105-98EEA6AEB3E1}"/>
+                </a:ext>
+              </a:extLst>
+            </p:cNvPr>
+            <p:cNvCxnSpPr>
+              <a:cxnSpLocks/>
+              <a:stCxn id="14" idx="1"/>
+              <a:endCxn id="28" idx="3"/>
+            </p:cNvCxnSpPr>
+            <p:nvPr/>
+          </p:nvCxnSpPr>
+          <p:spPr>
+            <a:xfrm rot="16200000" flipH="1">
+              <a:off x="6674445" y="2334606"/>
+              <a:ext cx="241882" cy="757065"/>
+            </a:xfrm>
+            <a:prstGeom prst="bentConnector3">
+              <a:avLst>
+                <a:gd name="adj1" fmla="val 50000"/>
+              </a:avLst>
+            </a:prstGeom>
+            <a:ln>
+              <a:tailEnd type="triangle"/>
+            </a:ln>
+          </p:spPr>
+          <p:style>
+            <a:lnRef idx="1">
+              <a:schemeClr val="accent6"/>
+            </a:lnRef>
+            <a:fillRef idx="0">
+              <a:schemeClr val="accent6"/>
+            </a:fillRef>
+            <a:effectRef idx="0">
+              <a:schemeClr val="accent6"/>
+            </a:effectRef>
+            <a:fontRef idx="minor">
+              <a:schemeClr val="tx1"/>
+            </a:fontRef>
+          </p:style>
+        </p:cxnSp>
+        <p:cxnSp>
+          <p:nvCxnSpPr>
+            <p:cNvPr id="64" name="Straight Arrow Connector 63">
+              <a:extLst>
+                <a:ext uri="{FF2B5EF4-FFF2-40B4-BE49-F238E27FC236}">
+                  <a16:creationId xmlns:a16="http://schemas.microsoft.com/office/drawing/2014/main" id="{56C28819-1C14-43FD-B492-6ED8B9C169CF}"/>
+                </a:ext>
+              </a:extLst>
+            </p:cNvPr>
+            <p:cNvCxnSpPr>
+              <a:cxnSpLocks/>
+              <a:stCxn id="26" idx="1"/>
+              <a:endCxn id="27" idx="3"/>
+            </p:cNvCxnSpPr>
+            <p:nvPr/>
+          </p:nvCxnSpPr>
+          <p:spPr>
+            <a:xfrm flipH="1">
+              <a:off x="5878544" y="3288485"/>
+              <a:ext cx="492" cy="146649"/>
+            </a:xfrm>
+            <a:prstGeom prst="straightConnector1">
+              <a:avLst/>
+            </a:prstGeom>
+            <a:ln>
+              <a:tailEnd type="triangle"/>
+            </a:ln>
+          </p:spPr>
+          <p:style>
+            <a:lnRef idx="1">
+              <a:schemeClr val="accent2"/>
+            </a:lnRef>
+            <a:fillRef idx="0">
+              <a:schemeClr val="accent2"/>
+            </a:fillRef>
+            <a:effectRef idx="0">
+              <a:schemeClr val="accent2"/>
+            </a:effectRef>
+            <a:fontRef idx="minor">
+              <a:schemeClr val="tx1"/>
+            </a:fontRef>
+          </p:style>
+        </p:cxnSp>
+        <p:cxnSp>
+          <p:nvCxnSpPr>
+            <p:cNvPr id="72" name="Connector: Elbow 71">
+              <a:extLst>
+                <a:ext uri="{FF2B5EF4-FFF2-40B4-BE49-F238E27FC236}">
+                  <a16:creationId xmlns:a16="http://schemas.microsoft.com/office/drawing/2014/main" id="{E1AA1479-07F9-4A8D-AA1B-1878BEE46BC2}"/>
+                </a:ext>
+              </a:extLst>
+            </p:cNvPr>
+            <p:cNvCxnSpPr>
+              <a:cxnSpLocks/>
+              <a:stCxn id="15" idx="1"/>
+              <a:endCxn id="29" idx="0"/>
+            </p:cNvCxnSpPr>
+            <p:nvPr/>
+          </p:nvCxnSpPr>
+          <p:spPr>
+            <a:xfrm rot="16200000" flipH="1">
+              <a:off x="6881172" y="3010765"/>
+              <a:ext cx="1060194" cy="223059"/>
+            </a:xfrm>
+            <a:prstGeom prst="bentConnector4">
+              <a:avLst>
+                <a:gd name="adj1" fmla="val 11393"/>
+                <a:gd name="adj2" fmla="val 153593"/>
+              </a:avLst>
+            </a:prstGeom>
+            <a:ln>
+              <a:tailEnd type="triangle"/>
+            </a:ln>
+          </p:spPr>
+          <p:style>
+            <a:lnRef idx="1">
+              <a:schemeClr val="accent6"/>
+            </a:lnRef>
+            <a:fillRef idx="0">
+              <a:schemeClr val="accent6"/>
+            </a:fillRef>
+            <a:effectRef idx="0">
+              <a:schemeClr val="accent6"/>
+            </a:effectRef>
+            <a:fontRef idx="minor">
+              <a:schemeClr val="tx1"/>
+            </a:fontRef>
+          </p:style>
+        </p:cxnSp>
+        <p:cxnSp>
+          <p:nvCxnSpPr>
+            <p:cNvPr id="75" name="Straight Arrow Connector 74">
+              <a:extLst>
+                <a:ext uri="{FF2B5EF4-FFF2-40B4-BE49-F238E27FC236}">
+                  <a16:creationId xmlns:a16="http://schemas.microsoft.com/office/drawing/2014/main" id="{3A34F692-4323-444A-A094-6C51FAF3D377}"/>
+                </a:ext>
+              </a:extLst>
+            </p:cNvPr>
+            <p:cNvCxnSpPr>
+              <a:cxnSpLocks/>
+              <a:stCxn id="28" idx="1"/>
+              <a:endCxn id="29" idx="3"/>
+            </p:cNvCxnSpPr>
+            <p:nvPr/>
+          </p:nvCxnSpPr>
+          <p:spPr>
+            <a:xfrm>
+              <a:off x="7173919" y="3263318"/>
+              <a:ext cx="0" cy="174455"/>
+            </a:xfrm>
+            <a:prstGeom prst="straightConnector1">
+              <a:avLst/>
+            </a:prstGeom>
+            <a:ln>
+              <a:tailEnd type="triangle"/>
+            </a:ln>
+          </p:spPr>
+          <p:style>
+            <a:lnRef idx="1">
+              <a:schemeClr val="accent6"/>
+            </a:lnRef>
+            <a:fillRef idx="0">
+              <a:schemeClr val="accent6"/>
+            </a:fillRef>
+            <a:effectRef idx="0">
+              <a:schemeClr val="accent6"/>
+            </a:effectRef>
+            <a:fontRef idx="minor">
+              <a:schemeClr val="tx1"/>
+            </a:fontRef>
+          </p:style>
+        </p:cxnSp>
+        <p:cxnSp>
+          <p:nvCxnSpPr>
+            <p:cNvPr id="89" name="Connector: Elbow 88">
+              <a:extLst>
+                <a:ext uri="{FF2B5EF4-FFF2-40B4-BE49-F238E27FC236}">
+                  <a16:creationId xmlns:a16="http://schemas.microsoft.com/office/drawing/2014/main" id="{9806CDF2-F263-435F-BB0A-B48C59E8296C}"/>
+                </a:ext>
+              </a:extLst>
+            </p:cNvPr>
+            <p:cNvCxnSpPr>
+              <a:cxnSpLocks/>
+              <a:stCxn id="16" idx="0"/>
+              <a:endCxn id="32" idx="3"/>
+            </p:cNvCxnSpPr>
+            <p:nvPr/>
+          </p:nvCxnSpPr>
+          <p:spPr>
+            <a:xfrm>
+              <a:off x="8447092" y="2427214"/>
+              <a:ext cx="318711" cy="452849"/>
+            </a:xfrm>
+            <a:prstGeom prst="bentConnector2">
+              <a:avLst/>
+            </a:prstGeom>
+            <a:ln>
+              <a:tailEnd type="triangle"/>
+            </a:ln>
+          </p:spPr>
+          <p:style>
+            <a:lnRef idx="1">
+              <a:schemeClr val="accent4"/>
+            </a:lnRef>
+            <a:fillRef idx="0">
+              <a:schemeClr val="accent4"/>
+            </a:fillRef>
+            <a:effectRef idx="0">
+              <a:schemeClr val="accent4"/>
+            </a:effectRef>
+            <a:fontRef idx="minor">
+              <a:schemeClr val="tx1"/>
+            </a:fontRef>
+          </p:style>
+        </p:cxnSp>
+        <p:cxnSp>
+          <p:nvCxnSpPr>
+            <p:cNvPr id="93" name="Straight Arrow Connector 92">
+              <a:extLst>
+                <a:ext uri="{FF2B5EF4-FFF2-40B4-BE49-F238E27FC236}">
+                  <a16:creationId xmlns:a16="http://schemas.microsoft.com/office/drawing/2014/main" id="{A8ED9369-5144-41B0-8F5E-017C5D92C9B1}"/>
+                </a:ext>
+              </a:extLst>
+            </p:cNvPr>
+            <p:cNvCxnSpPr>
+              <a:cxnSpLocks/>
+              <a:stCxn id="15" idx="0"/>
+              <a:endCxn id="32" idx="2"/>
+            </p:cNvCxnSpPr>
+            <p:nvPr/>
+          </p:nvCxnSpPr>
+          <p:spPr>
+            <a:xfrm>
+              <a:off x="7522799" y="2427214"/>
+              <a:ext cx="833610" cy="667468"/>
+            </a:xfrm>
+            <a:prstGeom prst="straightConnector1">
+              <a:avLst/>
+            </a:prstGeom>
+            <a:ln>
+              <a:tailEnd type="triangle"/>
+            </a:ln>
+          </p:spPr>
+          <p:style>
+            <a:lnRef idx="1">
+              <a:schemeClr val="accent4"/>
+            </a:lnRef>
+            <a:fillRef idx="0">
+              <a:schemeClr val="accent4"/>
+            </a:fillRef>
+            <a:effectRef idx="0">
+              <a:schemeClr val="accent4"/>
+            </a:effectRef>
+            <a:fontRef idx="minor">
+              <a:schemeClr val="tx1"/>
+            </a:fontRef>
+          </p:style>
+        </p:cxnSp>
+        <p:cxnSp>
+          <p:nvCxnSpPr>
+            <p:cNvPr id="99" name="Straight Arrow Connector 98">
+              <a:extLst>
+                <a:ext uri="{FF2B5EF4-FFF2-40B4-BE49-F238E27FC236}">
+                  <a16:creationId xmlns:a16="http://schemas.microsoft.com/office/drawing/2014/main" id="{6B469196-6B4B-4909-86C0-6484E6CCF52C}"/>
+                </a:ext>
+              </a:extLst>
+            </p:cNvPr>
+            <p:cNvCxnSpPr>
+              <a:cxnSpLocks/>
+              <a:stCxn id="15" idx="0"/>
+              <a:endCxn id="30" idx="3"/>
+            </p:cNvCxnSpPr>
+            <p:nvPr/>
+          </p:nvCxnSpPr>
+          <p:spPr>
+            <a:xfrm>
+              <a:off x="7522799" y="2427214"/>
+              <a:ext cx="785490" cy="1023601"/>
+            </a:xfrm>
+            <a:prstGeom prst="straightConnector1">
+              <a:avLst/>
+            </a:prstGeom>
+            <a:ln>
+              <a:tailEnd type="triangle"/>
+            </a:ln>
+          </p:spPr>
+          <p:style>
+            <a:lnRef idx="1">
+              <a:schemeClr val="accent4"/>
+            </a:lnRef>
+            <a:fillRef idx="0">
+              <a:schemeClr val="accent4"/>
+            </a:fillRef>
+            <a:effectRef idx="0">
+              <a:schemeClr val="accent4"/>
+            </a:effectRef>
+            <a:fontRef idx="minor">
+              <a:schemeClr val="tx1"/>
+            </a:fontRef>
+          </p:style>
+        </p:cxnSp>
+        <p:cxnSp>
+          <p:nvCxnSpPr>
+            <p:cNvPr id="103" name="Straight Arrow Connector 102">
+              <a:extLst>
+                <a:ext uri="{FF2B5EF4-FFF2-40B4-BE49-F238E27FC236}">
+                  <a16:creationId xmlns:a16="http://schemas.microsoft.com/office/drawing/2014/main" id="{24A05131-58CA-4009-857C-B7B16099FC38}"/>
+                </a:ext>
+              </a:extLst>
+            </p:cNvPr>
+            <p:cNvCxnSpPr>
+              <a:cxnSpLocks/>
+              <a:stCxn id="32" idx="1"/>
+              <a:endCxn id="30" idx="3"/>
+            </p:cNvCxnSpPr>
+            <p:nvPr/>
+          </p:nvCxnSpPr>
+          <p:spPr>
+            <a:xfrm flipH="1">
+              <a:off x="8308289" y="3309301"/>
+              <a:ext cx="457514" cy="141514"/>
+            </a:xfrm>
+            <a:prstGeom prst="straightConnector1">
+              <a:avLst/>
+            </a:prstGeom>
+            <a:ln>
+              <a:tailEnd type="triangle"/>
+            </a:ln>
+          </p:spPr>
+          <p:style>
+            <a:lnRef idx="1">
+              <a:schemeClr val="accent4"/>
+            </a:lnRef>
+            <a:fillRef idx="0">
+              <a:schemeClr val="accent4"/>
+            </a:fillRef>
+            <a:effectRef idx="0">
+              <a:schemeClr val="accent4"/>
+            </a:effectRef>
+            <a:fontRef idx="minor">
+              <a:schemeClr val="tx1"/>
+            </a:fontRef>
+          </p:style>
+        </p:cxnSp>
+        <mc:AlternateContent xmlns:mc="http://schemas.openxmlformats.org/markup-compatibility/2006">
+          <mc:Choice xmlns:a14="http://schemas.microsoft.com/office/drawing/2010/main" Requires="a14">
+            <p:sp>
+              <p:nvSpPr>
+                <p:cNvPr id="106" name="Rectangle: Single Corner Snipped 105">
+                  <a:extLst>
+                    <a:ext uri="{FF2B5EF4-FFF2-40B4-BE49-F238E27FC236}">
+                      <a16:creationId xmlns:a16="http://schemas.microsoft.com/office/drawing/2014/main" id="{84C7EB12-C284-413F-9788-3E9BED618DA7}"/>
+                    </a:ext>
+                  </a:extLst>
+                </p:cNvPr>
+                <p:cNvSpPr/>
+                <p:nvPr/>
+              </p:nvSpPr>
+              <p:spPr>
+                <a:xfrm>
+                  <a:off x="8872817" y="3437773"/>
+                  <a:ext cx="877548" cy="429238"/>
+                </a:xfrm>
+                <a:prstGeom prst="snip1Rect">
+                  <a:avLst/>
+                </a:prstGeom>
+                <a:solidFill>
+                  <a:schemeClr val="accent4">
+                    <a:alpha val="50000"/>
+                  </a:schemeClr>
+                </a:solidFill>
+                <a:ln>
+                  <a:noFill/>
+                </a:ln>
+              </p:spPr>
+              <p:style>
+                <a:lnRef idx="0">
+                  <a:scrgbClr r="0" g="0" b="0"/>
+                </a:lnRef>
+                <a:fillRef idx="0">
+                  <a:scrgbClr r="0" g="0" b="0"/>
+                </a:fillRef>
+                <a:effectRef idx="0">
+                  <a:scrgbClr r="0" g="0" b="0"/>
+                </a:effectRef>
+                <a:fontRef idx="minor">
+                  <a:schemeClr val="lt1"/>
+                </a:fontRef>
+              </p:style>
+              <p:txBody>
+                <a:bodyPr rtlCol="0" anchor="ctr"/>
+                <a:lstStyle/>
+                <a:p>
+                  <a:pPr algn="ctr"/>
+                  <a14:m>
+                    <m:oMathPara xmlns:m="http://schemas.openxmlformats.org/officeDocument/2006/math">
+                      <m:oMathParaPr>
+                        <m:jc m:val="centerGroup"/>
+                      </m:oMathParaPr>
+                      <m:oMath xmlns:m="http://schemas.openxmlformats.org/officeDocument/2006/math">
+                        <m:acc>
+                          <m:accPr>
+                            <m:chr m:val="̂"/>
+                            <m:ctrlPr>
+                              <a:rPr lang="en-US" sz="1400" i="1" smtClean="0">
+                                <a:solidFill>
+                                  <a:schemeClr val="tx1"/>
+                                </a:solidFill>
+                                <a:latin typeface="Cambria Math" panose="02040503050406030204" pitchFamily="18" charset="0"/>
+                              </a:rPr>
+                            </m:ctrlPr>
+                          </m:accPr>
+                          <m:e>
+                            <m:r>
+                              <a:rPr lang="el-GR" sz="1400" i="1" smtClean="0">
+                                <a:solidFill>
+                                  <a:schemeClr val="tx1"/>
+                                </a:solidFill>
+                                <a:latin typeface="Cambria Math" panose="02040503050406030204" pitchFamily="18" charset="0"/>
+                                <a:ea typeface="Cambria Math" panose="02040503050406030204" pitchFamily="18" charset="0"/>
+                              </a:rPr>
+                              <m:t>𝜀</m:t>
+                            </m:r>
+                          </m:e>
+                        </m:acc>
+                      </m:oMath>
+                    </m:oMathPara>
+                  </a14:m>
+                  <a:endParaRPr lang="en-US" sz="1400" dirty="0">
+                    <a:solidFill>
+                      <a:schemeClr val="tx1"/>
+                    </a:solidFill>
+                  </a:endParaRPr>
+                </a:p>
+                <a:p>
+                  <a:pPr algn="ctr"/>
+                  <a:r>
+                    <a:rPr lang="en-US" sz="800" i="1" dirty="0">
+                      <a:solidFill>
+                        <a:schemeClr val="tx1"/>
+                      </a:solidFill>
+                    </a:rPr>
+                    <a:t>LTV-SOBI-alt</a:t>
+                  </a:r>
+                </a:p>
+              </p:txBody>
+            </p:sp>
+          </mc:Choice>
+          <mc:Fallback>
+            <p:sp>
+              <p:nvSpPr>
+                <p:cNvPr id="106" name="Rectangle: Single Corner Snipped 105">
+                  <a:extLst>
+                    <a:ext uri="{FF2B5EF4-FFF2-40B4-BE49-F238E27FC236}">
+                      <a16:creationId xmlns:a16="http://schemas.microsoft.com/office/drawing/2014/main" id="{84C7EB12-C284-413F-9788-3E9BED618DA7}"/>
+                    </a:ext>
+                  </a:extLst>
+                </p:cNvPr>
+                <p:cNvSpPr>
+                  <a:spLocks noRot="1" noChangeAspect="1" noMove="1" noResize="1" noEditPoints="1" noAdjustHandles="1" noChangeArrowheads="1" noChangeShapeType="1" noTextEdit="1"/>
+                </p:cNvSpPr>
+                <p:nvPr/>
+              </p:nvSpPr>
+              <p:spPr>
+                <a:xfrm>
+                  <a:off x="8872817" y="3437773"/>
+                  <a:ext cx="877548" cy="429238"/>
+                </a:xfrm>
+                <a:prstGeom prst="snip1Rect">
+                  <a:avLst/>
+                </a:prstGeom>
+                <a:blipFill>
+                  <a:blip r:embed="rId12"/>
+                  <a:stretch>
+                    <a:fillRect b="-10000"/>
+                  </a:stretch>
+                </a:blipFill>
+                <a:ln>
+                  <a:noFill/>
+                </a:ln>
+              </p:spPr>
+              <p:txBody>
+                <a:bodyPr/>
+                <a:lstStyle/>
+                <a:p>
+                  <a:r>
+                    <a:rPr lang="en-US">
+                      <a:noFill/>
+                    </a:rPr>
+                    <a:t> </a:t>
+                  </a:r>
+                </a:p>
+              </p:txBody>
+            </p:sp>
+          </mc:Fallback>
+        </mc:AlternateContent>
+        <p:cxnSp>
+          <p:nvCxnSpPr>
+            <p:cNvPr id="113" name="Connector: Elbow 112">
+              <a:extLst>
+                <a:ext uri="{FF2B5EF4-FFF2-40B4-BE49-F238E27FC236}">
+                  <a16:creationId xmlns:a16="http://schemas.microsoft.com/office/drawing/2014/main" id="{018D3E2D-22D2-4F19-8ACE-AB4A8F170D02}"/>
+                </a:ext>
+              </a:extLst>
+            </p:cNvPr>
+            <p:cNvCxnSpPr>
+              <a:cxnSpLocks/>
+              <a:stCxn id="32" idx="0"/>
+              <a:endCxn id="106" idx="3"/>
+            </p:cNvCxnSpPr>
+            <p:nvPr/>
+          </p:nvCxnSpPr>
+          <p:spPr>
+            <a:xfrm>
+              <a:off x="9175197" y="3094682"/>
+              <a:ext cx="136394" cy="343091"/>
+            </a:xfrm>
+            <a:prstGeom prst="bentConnector2">
+              <a:avLst/>
+            </a:prstGeom>
+            <a:ln>
+              <a:tailEnd type="triangle"/>
+            </a:ln>
+          </p:spPr>
+          <p:style>
+            <a:lnRef idx="1">
+              <a:schemeClr val="accent4"/>
+            </a:lnRef>
+            <a:fillRef idx="0">
+              <a:schemeClr val="accent4"/>
+            </a:fillRef>
+            <a:effectRef idx="0">
+              <a:schemeClr val="accent4"/>
+            </a:effectRef>
+            <a:fontRef idx="minor">
+              <a:schemeClr val="tx1"/>
+            </a:fontRef>
+          </p:style>
+        </p:cxnSp>
+        <p:cxnSp>
+          <p:nvCxnSpPr>
+            <p:cNvPr id="116" name="Straight Arrow Connector 115">
+              <a:extLst>
+                <a:ext uri="{FF2B5EF4-FFF2-40B4-BE49-F238E27FC236}">
+                  <a16:creationId xmlns:a16="http://schemas.microsoft.com/office/drawing/2014/main" id="{66F17C18-E0B7-4586-81CC-F24135755C17}"/>
+                </a:ext>
+              </a:extLst>
+            </p:cNvPr>
+            <p:cNvCxnSpPr>
+              <a:cxnSpLocks/>
+              <a:stCxn id="30" idx="0"/>
+              <a:endCxn id="106" idx="2"/>
+            </p:cNvCxnSpPr>
+            <p:nvPr/>
+          </p:nvCxnSpPr>
+          <p:spPr>
+            <a:xfrm flipV="1">
+              <a:off x="8717683" y="3652392"/>
+              <a:ext cx="155134" cy="13042"/>
+            </a:xfrm>
+            <a:prstGeom prst="straightConnector1">
+              <a:avLst/>
+            </a:prstGeom>
+            <a:ln>
+              <a:tailEnd type="triangle"/>
+            </a:ln>
+          </p:spPr>
+          <p:style>
+            <a:lnRef idx="1">
+              <a:schemeClr val="accent4"/>
+            </a:lnRef>
+            <a:fillRef idx="0">
+              <a:schemeClr val="accent4"/>
+            </a:fillRef>
+            <a:effectRef idx="0">
+              <a:schemeClr val="accent4"/>
+            </a:effectRef>
+            <a:fontRef idx="minor">
+              <a:schemeClr val="tx1"/>
+            </a:fontRef>
+          </p:style>
+        </p:cxnSp>
+        <p:sp>
+          <p:nvSpPr>
+            <p:cNvPr id="34" name="Rectangle: Rounded Corners 33">
+              <a:extLst>
+                <a:ext uri="{FF2B5EF4-FFF2-40B4-BE49-F238E27FC236}">
+                  <a16:creationId xmlns:a16="http://schemas.microsoft.com/office/drawing/2014/main" id="{99DA0063-75B4-4585-BB9B-3F04309A0E95}"/>
+                </a:ext>
+              </a:extLst>
+            </p:cNvPr>
+            <p:cNvSpPr/>
+            <p:nvPr/>
+          </p:nvSpPr>
+          <p:spPr>
+            <a:xfrm>
+              <a:off x="6545780" y="4439173"/>
+              <a:ext cx="1528297" cy="268448"/>
+            </a:xfrm>
+            <a:prstGeom prst="roundRect">
+              <a:avLst/>
+            </a:prstGeom>
+            <a:solidFill>
+              <a:schemeClr val="accent1">
+                <a:alpha val="50000"/>
+              </a:schemeClr>
+            </a:solidFill>
+            <a:ln>
+              <a:noFill/>
+            </a:ln>
+          </p:spPr>
+          <p:style>
+            <a:lnRef idx="0">
+              <a:scrgbClr r="0" g="0" b="0"/>
+            </a:lnRef>
+            <a:fillRef idx="0">
+              <a:scrgbClr r="0" g="0" b="0"/>
+            </a:fillRef>
+            <a:effectRef idx="0">
+              <a:scrgbClr r="0" g="0" b="0"/>
+            </a:effectRef>
+            <a:fontRef idx="minor">
+              <a:schemeClr val="lt1"/>
+            </a:fontRef>
+          </p:style>
+          <p:txBody>
+            <a:bodyPr rtlCol="0" anchor="ctr"/>
+            <a:lstStyle/>
+            <a:p>
+              <a:pPr algn="ctr"/>
+              <a:r>
+                <a:rPr lang="en-US" sz="1400" dirty="0">
+                  <a:solidFill>
+                    <a:schemeClr val="tx1"/>
+                  </a:solidFill>
+                </a:rPr>
+                <a:t>Restored Signal</a:t>
+              </a:r>
+            </a:p>
+          </p:txBody>
+        </p:sp>
+        <p:cxnSp>
+          <p:nvCxnSpPr>
+            <p:cNvPr id="35" name="Connector: Elbow 34">
+              <a:extLst>
+                <a:ext uri="{FF2B5EF4-FFF2-40B4-BE49-F238E27FC236}">
+                  <a16:creationId xmlns:a16="http://schemas.microsoft.com/office/drawing/2014/main" id="{20E54761-41B8-4631-8CA4-E95418634E9E}"/>
+                </a:ext>
+              </a:extLst>
+            </p:cNvPr>
+            <p:cNvCxnSpPr>
+              <a:cxnSpLocks/>
+              <a:stCxn id="26" idx="2"/>
+              <a:endCxn id="34" idx="1"/>
+            </p:cNvCxnSpPr>
+            <p:nvPr/>
+          </p:nvCxnSpPr>
+          <p:spPr>
+            <a:xfrm rot="10800000" flipH="1" flipV="1">
+              <a:off x="5530154" y="3073865"/>
+              <a:ext cx="1015625" cy="1499531"/>
+            </a:xfrm>
+            <a:prstGeom prst="bentConnector3">
+              <a:avLst>
+                <a:gd name="adj1" fmla="val -22508"/>
+              </a:avLst>
+            </a:prstGeom>
+            <a:ln w="9525" cap="flat" cmpd="sng" algn="ctr">
+              <a:solidFill>
+                <a:schemeClr val="accent2"/>
+              </a:solidFill>
+              <a:prstDash val="dash"/>
+              <a:round/>
+              <a:headEnd type="none" w="med" len="med"/>
+              <a:tailEnd type="arrow" w="med" len="med"/>
+            </a:ln>
+          </p:spPr>
+          <p:style>
+            <a:lnRef idx="0">
+              <a:scrgbClr r="0" g="0" b="0"/>
+            </a:lnRef>
+            <a:fillRef idx="0">
+              <a:scrgbClr r="0" g="0" b="0"/>
+            </a:fillRef>
+            <a:effectRef idx="0">
+              <a:scrgbClr r="0" g="0" b="0"/>
+            </a:effectRef>
+            <a:fontRef idx="minor">
+              <a:schemeClr val="tx1"/>
+            </a:fontRef>
+          </p:style>
+        </p:cxnSp>
+        <p:cxnSp>
+          <p:nvCxnSpPr>
+            <p:cNvPr id="38" name="Connector: Elbow 37">
+              <a:extLst>
+                <a:ext uri="{FF2B5EF4-FFF2-40B4-BE49-F238E27FC236}">
+                  <a16:creationId xmlns:a16="http://schemas.microsoft.com/office/drawing/2014/main" id="{EAD96C09-DD13-4CDB-B7FB-6E0D2B55955F}"/>
+                </a:ext>
+              </a:extLst>
+            </p:cNvPr>
+            <p:cNvCxnSpPr>
+              <a:cxnSpLocks/>
+              <a:stCxn id="27" idx="2"/>
+              <a:endCxn id="34" idx="1"/>
+            </p:cNvCxnSpPr>
+            <p:nvPr/>
+          </p:nvCxnSpPr>
+          <p:spPr>
+            <a:xfrm rot="10800000" flipH="1" flipV="1">
+              <a:off x="5529662" y="3649753"/>
+              <a:ext cx="1016117" cy="923644"/>
+            </a:xfrm>
+            <a:prstGeom prst="bentConnector3">
+              <a:avLst>
+                <a:gd name="adj1" fmla="val -22497"/>
+              </a:avLst>
+            </a:prstGeom>
+            <a:ln w="9525" cap="flat" cmpd="sng" algn="ctr">
+              <a:solidFill>
+                <a:schemeClr val="accent2"/>
+              </a:solidFill>
+              <a:prstDash val="dash"/>
+              <a:round/>
+              <a:headEnd type="none" w="med" len="med"/>
+              <a:tailEnd type="arrow" w="med" len="med"/>
+            </a:ln>
+          </p:spPr>
+          <p:style>
+            <a:lnRef idx="0">
+              <a:scrgbClr r="0" g="0" b="0"/>
+            </a:lnRef>
+            <a:fillRef idx="0">
+              <a:scrgbClr r="0" g="0" b="0"/>
+            </a:fillRef>
+            <a:effectRef idx="0">
+              <a:scrgbClr r="0" g="0" b="0"/>
+            </a:effectRef>
+            <a:fontRef idx="minor">
+              <a:schemeClr val="tx1"/>
+            </a:fontRef>
+          </p:style>
+        </p:cxnSp>
+        <p:cxnSp>
+          <p:nvCxnSpPr>
+            <p:cNvPr id="44" name="Connector: Elbow 43">
+              <a:extLst>
+                <a:ext uri="{FF2B5EF4-FFF2-40B4-BE49-F238E27FC236}">
+                  <a16:creationId xmlns:a16="http://schemas.microsoft.com/office/drawing/2014/main" id="{F204A4CA-D408-44D7-9DEC-E3D8E2515EFA}"/>
+                </a:ext>
+              </a:extLst>
+            </p:cNvPr>
+            <p:cNvCxnSpPr>
+              <a:cxnSpLocks/>
+              <a:stCxn id="15" idx="1"/>
+              <a:endCxn id="28" idx="3"/>
+            </p:cNvCxnSpPr>
+            <p:nvPr/>
+          </p:nvCxnSpPr>
+          <p:spPr>
+            <a:xfrm rot="5400000">
+              <a:off x="7115889" y="2650229"/>
+              <a:ext cx="241882" cy="125821"/>
+            </a:xfrm>
+            <a:prstGeom prst="bentConnector3">
+              <a:avLst>
+                <a:gd name="adj1" fmla="val 50000"/>
+              </a:avLst>
+            </a:prstGeom>
+            <a:ln>
+              <a:tailEnd type="triangle"/>
+            </a:ln>
+          </p:spPr>
+          <p:style>
+            <a:lnRef idx="1">
+              <a:schemeClr val="accent6"/>
+            </a:lnRef>
+            <a:fillRef idx="0">
+              <a:schemeClr val="accent6"/>
+            </a:fillRef>
+            <a:effectRef idx="0">
+              <a:schemeClr val="accent6"/>
+            </a:effectRef>
+            <a:fontRef idx="minor">
+              <a:schemeClr val="tx1"/>
+            </a:fontRef>
+          </p:style>
+        </p:cxnSp>
+        <p:cxnSp>
+          <p:nvCxnSpPr>
+            <p:cNvPr id="51" name="Connector: Elbow 50">
+              <a:extLst>
+                <a:ext uri="{FF2B5EF4-FFF2-40B4-BE49-F238E27FC236}">
+                  <a16:creationId xmlns:a16="http://schemas.microsoft.com/office/drawing/2014/main" id="{C9F50E7B-AD32-42A9-BE11-61C58AC8470C}"/>
+                </a:ext>
+              </a:extLst>
+            </p:cNvPr>
+            <p:cNvCxnSpPr>
+              <a:cxnSpLocks/>
+              <a:stCxn id="28" idx="2"/>
+              <a:endCxn id="34" idx="0"/>
+            </p:cNvCxnSpPr>
+            <p:nvPr/>
+          </p:nvCxnSpPr>
+          <p:spPr>
+            <a:xfrm rot="10800000" flipH="1" flipV="1">
+              <a:off x="6825037" y="3048699"/>
+              <a:ext cx="484891" cy="1390474"/>
+            </a:xfrm>
+            <a:prstGeom prst="bentConnector4">
+              <a:avLst>
+                <a:gd name="adj1" fmla="val -47145"/>
+                <a:gd name="adj2" fmla="val 78833"/>
+              </a:avLst>
+            </a:prstGeom>
+            <a:ln w="9525" cap="flat" cmpd="sng" algn="ctr">
+              <a:solidFill>
+                <a:schemeClr val="accent6"/>
+              </a:solidFill>
+              <a:prstDash val="dash"/>
+              <a:round/>
+              <a:headEnd type="none" w="med" len="med"/>
+              <a:tailEnd type="arrow" w="med" len="med"/>
+            </a:ln>
+          </p:spPr>
+          <p:style>
+            <a:lnRef idx="0">
+              <a:scrgbClr r="0" g="0" b="0"/>
+            </a:lnRef>
+            <a:fillRef idx="0">
+              <a:scrgbClr r="0" g="0" b="0"/>
+            </a:fillRef>
+            <a:effectRef idx="0">
+              <a:scrgbClr r="0" g="0" b="0"/>
+            </a:effectRef>
+            <a:fontRef idx="minor">
+              <a:schemeClr val="tx1"/>
+            </a:fontRef>
+          </p:style>
+        </p:cxnSp>
+        <p:cxnSp>
+          <p:nvCxnSpPr>
+            <p:cNvPr id="56" name="Connector: Elbow 55">
+              <a:extLst>
+                <a:ext uri="{FF2B5EF4-FFF2-40B4-BE49-F238E27FC236}">
+                  <a16:creationId xmlns:a16="http://schemas.microsoft.com/office/drawing/2014/main" id="{51605E8E-420D-4A40-A445-201CF83350A8}"/>
+                </a:ext>
+              </a:extLst>
+            </p:cNvPr>
+            <p:cNvCxnSpPr>
+              <a:cxnSpLocks/>
+              <a:stCxn id="29" idx="2"/>
+              <a:endCxn id="34" idx="0"/>
+            </p:cNvCxnSpPr>
+            <p:nvPr/>
+          </p:nvCxnSpPr>
+          <p:spPr>
+            <a:xfrm rot="10800000" flipH="1" flipV="1">
+              <a:off x="6825037" y="3652391"/>
+              <a:ext cx="484891" cy="786781"/>
+            </a:xfrm>
+            <a:prstGeom prst="bentConnector4">
+              <a:avLst>
+                <a:gd name="adj1" fmla="val -47145"/>
+                <a:gd name="adj2" fmla="val 63639"/>
+              </a:avLst>
+            </a:prstGeom>
+            <a:ln w="9525" cap="flat" cmpd="sng" algn="ctr">
+              <a:solidFill>
+                <a:schemeClr val="accent6"/>
+              </a:solidFill>
+              <a:prstDash val="dash"/>
+              <a:round/>
+              <a:headEnd type="none" w="med" len="med"/>
+              <a:tailEnd type="arrow" w="med" len="med"/>
+            </a:ln>
+          </p:spPr>
+          <p:style>
+            <a:lnRef idx="0">
+              <a:scrgbClr r="0" g="0" b="0"/>
+            </a:lnRef>
+            <a:fillRef idx="0">
+              <a:scrgbClr r="0" g="0" b="0"/>
+            </a:fillRef>
+            <a:effectRef idx="0">
+              <a:scrgbClr r="0" g="0" b="0"/>
+            </a:effectRef>
+            <a:fontRef idx="minor">
+              <a:schemeClr val="tx1"/>
+            </a:fontRef>
+          </p:style>
+        </p:cxnSp>
+        <p:cxnSp>
+          <p:nvCxnSpPr>
+            <p:cNvPr id="60" name="Connector: Elbow 59">
+              <a:extLst>
+                <a:ext uri="{FF2B5EF4-FFF2-40B4-BE49-F238E27FC236}">
+                  <a16:creationId xmlns:a16="http://schemas.microsoft.com/office/drawing/2014/main" id="{D0B7F814-82C3-48BE-AE59-8AC448E5A705}"/>
+                </a:ext>
+              </a:extLst>
+            </p:cNvPr>
+            <p:cNvCxnSpPr>
+              <a:cxnSpLocks/>
+              <a:endCxn id="34" idx="3"/>
+            </p:cNvCxnSpPr>
+            <p:nvPr/>
+          </p:nvCxnSpPr>
+          <p:spPr>
+            <a:xfrm rot="5400000">
+              <a:off x="7844513" y="4109618"/>
+              <a:ext cx="693343" cy="234214"/>
+            </a:xfrm>
+            <a:prstGeom prst="bentConnector2">
+              <a:avLst/>
+            </a:prstGeom>
+            <a:ln w="9525" cap="flat" cmpd="sng" algn="ctr">
+              <a:solidFill>
+                <a:schemeClr val="accent4"/>
+              </a:solidFill>
+              <a:prstDash val="dash"/>
+              <a:round/>
+              <a:headEnd type="none" w="med" len="med"/>
+              <a:tailEnd type="arrow" w="med" len="med"/>
+            </a:ln>
+          </p:spPr>
+          <p:style>
+            <a:lnRef idx="0">
+              <a:scrgbClr r="0" g="0" b="0"/>
+            </a:lnRef>
+            <a:fillRef idx="0">
+              <a:scrgbClr r="0" g="0" b="0"/>
+            </a:fillRef>
+            <a:effectRef idx="0">
+              <a:scrgbClr r="0" g="0" b="0"/>
+            </a:effectRef>
+            <a:fontRef idx="minor">
+              <a:schemeClr val="tx1"/>
+            </a:fontRef>
+          </p:style>
+        </p:cxnSp>
+        <p:cxnSp>
+          <p:nvCxnSpPr>
+            <p:cNvPr id="63" name="Connector: Elbow 62">
+              <a:extLst>
+                <a:ext uri="{FF2B5EF4-FFF2-40B4-BE49-F238E27FC236}">
+                  <a16:creationId xmlns:a16="http://schemas.microsoft.com/office/drawing/2014/main" id="{39A4F0A3-49D3-45B4-81D7-1C186A55DA9F}"/>
+                </a:ext>
+              </a:extLst>
+            </p:cNvPr>
+            <p:cNvCxnSpPr>
+              <a:cxnSpLocks/>
+              <a:stCxn id="106" idx="1"/>
+              <a:endCxn id="34" idx="3"/>
+            </p:cNvCxnSpPr>
+            <p:nvPr/>
+          </p:nvCxnSpPr>
+          <p:spPr>
+            <a:xfrm rot="5400000">
+              <a:off x="8339641" y="3601447"/>
+              <a:ext cx="706386" cy="1237514"/>
+            </a:xfrm>
+            <a:prstGeom prst="bentConnector2">
+              <a:avLst/>
+            </a:prstGeom>
+            <a:ln w="9525" cap="flat" cmpd="sng" algn="ctr">
+              <a:solidFill>
+                <a:schemeClr val="accent4"/>
+              </a:solidFill>
+              <a:prstDash val="dash"/>
+              <a:round/>
+              <a:headEnd type="none" w="med" len="med"/>
+              <a:tailEnd type="arrow" w="med" len="med"/>
+            </a:ln>
+          </p:spPr>
+          <p:style>
+            <a:lnRef idx="0">
+              <a:scrgbClr r="0" g="0" b="0"/>
+            </a:lnRef>
+            <a:fillRef idx="0">
+              <a:scrgbClr r="0" g="0" b="0"/>
+            </a:fillRef>
+            <a:effectRef idx="0">
+              <a:scrgbClr r="0" g="0" b="0"/>
+            </a:effectRef>
+            <a:fontRef idx="minor">
+              <a:schemeClr val="tx1"/>
+            </a:fontRef>
+          </p:style>
+        </p:cxnSp>
+        <p:sp>
+          <p:nvSpPr>
+            <p:cNvPr id="73" name="TextBox 72">
+              <a:extLst>
+                <a:ext uri="{FF2B5EF4-FFF2-40B4-BE49-F238E27FC236}">
+                  <a16:creationId xmlns:a16="http://schemas.microsoft.com/office/drawing/2014/main" id="{B09D9A75-2A89-4B46-ADC5-C6301AC94B6C}"/>
+                </a:ext>
+              </a:extLst>
+            </p:cNvPr>
+            <p:cNvSpPr txBox="1"/>
+            <p:nvPr/>
+          </p:nvSpPr>
+          <p:spPr>
+            <a:xfrm>
+              <a:off x="6440606" y="4147547"/>
+              <a:ext cx="1928733" cy="261610"/>
+            </a:xfrm>
+            <a:prstGeom prst="rect">
+              <a:avLst/>
+            </a:prstGeom>
+            <a:noFill/>
+          </p:spPr>
+          <p:txBody>
+            <a:bodyPr wrap="none" rtlCol="0">
+              <a:spAutoFit/>
+            </a:bodyPr>
+            <a:lstStyle/>
+            <a:p>
+              <a:r>
+                <a:rPr lang="en-US" sz="1100" i="1" dirty="0">
+                  <a:solidFill>
+                    <a:schemeClr val="tx1">
+                      <a:lumMod val="50000"/>
+                      <a:lumOff val="50000"/>
+                    </a:schemeClr>
+                  </a:solidFill>
+                </a:rPr>
+                <a:t>Restoration (inverse of mixing)</a:t>
+              </a:r>
+            </a:p>
+          </p:txBody>
+        </p:sp>
+      </p:grpSp>
+    </p:spTree>
+    <p:extLst>
+      <p:ext uri="{BB962C8B-B14F-4D97-AF65-F5344CB8AC3E}">
+        <p14:creationId xmlns:p14="http://schemas.microsoft.com/office/powerpoint/2010/main" val="619504292"/>
+      </p:ext>
+    </p:extLst>
+  </p:cSld>
+  <p:clrMapOvr>
+    <a:masterClrMapping/>
+  </p:clrMapOvr>
+</p:sld>
+</file>
+
 <file path=ppt/theme/theme1.xml><?xml version="1.0" encoding="utf-8"?>
 <a:theme xmlns:a="http://schemas.openxmlformats.org/drawingml/2006/main" name="Office Theme">
   <a:themeElements>

</xml_diff>

<commit_message>
both new report and new web
</commit_message>
<xml_diff>
--- a/thesis/BSS_pic.pptx
+++ b/thesis/BSS_pic.pptx
@@ -262,7 +262,7 @@
           <a:p>
             <a:fld id="{3F7A6499-4D5B-41F3-A4B0-AD2534926E51}" type="datetimeFigureOut">
               <a:rPr lang="en-US" smtClean="0"/>
-              <a:t>6/27/2019</a:t>
+              <a:t>7/12/2019</a:t>
             </a:fld>
             <a:endParaRPr lang="en-US"/>
           </a:p>
@@ -460,7 +460,7 @@
           <a:p>
             <a:fld id="{3F7A6499-4D5B-41F3-A4B0-AD2534926E51}" type="datetimeFigureOut">
               <a:rPr lang="en-US" smtClean="0"/>
-              <a:t>6/27/2019</a:t>
+              <a:t>7/12/2019</a:t>
             </a:fld>
             <a:endParaRPr lang="en-US"/>
           </a:p>
@@ -668,7 +668,7 @@
           <a:p>
             <a:fld id="{3F7A6499-4D5B-41F3-A4B0-AD2534926E51}" type="datetimeFigureOut">
               <a:rPr lang="en-US" smtClean="0"/>
-              <a:t>6/27/2019</a:t>
+              <a:t>7/12/2019</a:t>
             </a:fld>
             <a:endParaRPr lang="en-US"/>
           </a:p>
@@ -866,7 +866,7 @@
           <a:p>
             <a:fld id="{3F7A6499-4D5B-41F3-A4B0-AD2534926E51}" type="datetimeFigureOut">
               <a:rPr lang="en-US" smtClean="0"/>
-              <a:t>6/27/2019</a:t>
+              <a:t>7/12/2019</a:t>
             </a:fld>
             <a:endParaRPr lang="en-US"/>
           </a:p>
@@ -1141,7 +1141,7 @@
           <a:p>
             <a:fld id="{3F7A6499-4D5B-41F3-A4B0-AD2534926E51}" type="datetimeFigureOut">
               <a:rPr lang="en-US" smtClean="0"/>
-              <a:t>6/27/2019</a:t>
+              <a:t>7/12/2019</a:t>
             </a:fld>
             <a:endParaRPr lang="en-US"/>
           </a:p>
@@ -1406,7 +1406,7 @@
           <a:p>
             <a:fld id="{3F7A6499-4D5B-41F3-A4B0-AD2534926E51}" type="datetimeFigureOut">
               <a:rPr lang="en-US" smtClean="0"/>
-              <a:t>6/27/2019</a:t>
+              <a:t>7/12/2019</a:t>
             </a:fld>
             <a:endParaRPr lang="en-US"/>
           </a:p>
@@ -1818,7 +1818,7 @@
           <a:p>
             <a:fld id="{3F7A6499-4D5B-41F3-A4B0-AD2534926E51}" type="datetimeFigureOut">
               <a:rPr lang="en-US" smtClean="0"/>
-              <a:t>6/27/2019</a:t>
+              <a:t>7/12/2019</a:t>
             </a:fld>
             <a:endParaRPr lang="en-US"/>
           </a:p>
@@ -1959,7 +1959,7 @@
           <a:p>
             <a:fld id="{3F7A6499-4D5B-41F3-A4B0-AD2534926E51}" type="datetimeFigureOut">
               <a:rPr lang="en-US" smtClean="0"/>
-              <a:t>6/27/2019</a:t>
+              <a:t>7/12/2019</a:t>
             </a:fld>
             <a:endParaRPr lang="en-US"/>
           </a:p>
@@ -2072,7 +2072,7 @@
           <a:p>
             <a:fld id="{3F7A6499-4D5B-41F3-A4B0-AD2534926E51}" type="datetimeFigureOut">
               <a:rPr lang="en-US" smtClean="0"/>
-              <a:t>6/27/2019</a:t>
+              <a:t>7/12/2019</a:t>
             </a:fld>
             <a:endParaRPr lang="en-US"/>
           </a:p>
@@ -2383,7 +2383,7 @@
           <a:p>
             <a:fld id="{3F7A6499-4D5B-41F3-A4B0-AD2534926E51}" type="datetimeFigureOut">
               <a:rPr lang="en-US" smtClean="0"/>
-              <a:t>6/27/2019</a:t>
+              <a:t>7/12/2019</a:t>
             </a:fld>
             <a:endParaRPr lang="en-US"/>
           </a:p>
@@ -2671,7 +2671,7 @@
           <a:p>
             <a:fld id="{3F7A6499-4D5B-41F3-A4B0-AD2534926E51}" type="datetimeFigureOut">
               <a:rPr lang="en-US" smtClean="0"/>
-              <a:t>6/27/2019</a:t>
+              <a:t>7/12/2019</a:t>
             </a:fld>
             <a:endParaRPr lang="en-US"/>
           </a:p>
@@ -2912,7 +2912,7 @@
           <a:p>
             <a:fld id="{3F7A6499-4D5B-41F3-A4B0-AD2534926E51}" type="datetimeFigureOut">
               <a:rPr lang="en-US" smtClean="0"/>
-              <a:t>6/27/2019</a:t>
+              <a:t>7/12/2019</a:t>
             </a:fld>
             <a:endParaRPr lang="en-US"/>
           </a:p>
@@ -9398,10 +9398,10 @@
       </p:grpSpPr>
       <p:grpSp>
         <p:nvGrpSpPr>
-          <p:cNvPr id="135" name="Group 134">
+          <p:cNvPr id="40" name="Group 39">
             <a:extLst>
               <a:ext uri="{FF2B5EF4-FFF2-40B4-BE49-F238E27FC236}">
-                <a16:creationId xmlns:a16="http://schemas.microsoft.com/office/drawing/2014/main" id="{CFEB0ED4-6C7C-4CAC-82A7-14E7CD8B0CDA}"/>
+                <a16:creationId xmlns:a16="http://schemas.microsoft.com/office/drawing/2014/main" id="{E29960AE-F350-4BF0-B9B2-09E529F1138B}"/>
               </a:ext>
             </a:extLst>
           </p:cNvPr>
@@ -9410,12 +9410,199 @@
         </p:nvGrpSpPr>
         <p:grpSpPr>
           <a:xfrm>
-            <a:off x="357852" y="922789"/>
-            <a:ext cx="10927574" cy="2275166"/>
-            <a:chOff x="357852" y="922789"/>
-            <a:chExt cx="10927574" cy="2275166"/>
+            <a:off x="357852" y="922788"/>
+            <a:ext cx="7161070" cy="3526866"/>
+            <a:chOff x="357852" y="922788"/>
+            <a:chExt cx="7161070" cy="3526866"/>
           </a:xfrm>
         </p:grpSpPr>
+        <p:grpSp>
+          <p:nvGrpSpPr>
+            <p:cNvPr id="36" name="Group 35">
+              <a:extLst>
+                <a:ext uri="{FF2B5EF4-FFF2-40B4-BE49-F238E27FC236}">
+                  <a16:creationId xmlns:a16="http://schemas.microsoft.com/office/drawing/2014/main" id="{C5B35ED9-8535-4699-8EA6-B175E5E0E1B0}"/>
+                </a:ext>
+              </a:extLst>
+            </p:cNvPr>
+            <p:cNvGrpSpPr/>
+            <p:nvPr/>
+          </p:nvGrpSpPr>
+          <p:grpSpPr>
+            <a:xfrm>
+              <a:off x="2364487" y="922788"/>
+              <a:ext cx="5068159" cy="3526866"/>
+              <a:chOff x="2364487" y="922788"/>
+              <a:chExt cx="5068159" cy="3526866"/>
+            </a:xfrm>
+          </p:grpSpPr>
+          <p:sp>
+            <p:nvSpPr>
+              <p:cNvPr id="130" name="Rectangle: Rounded Corners 129">
+                <a:extLst>
+                  <a:ext uri="{FF2B5EF4-FFF2-40B4-BE49-F238E27FC236}">
+                    <a16:creationId xmlns:a16="http://schemas.microsoft.com/office/drawing/2014/main" id="{61F7DE67-435C-4810-A6C0-92E2BC4DAC87}"/>
+                  </a:ext>
+                </a:extLst>
+              </p:cNvPr>
+              <p:cNvSpPr/>
+              <p:nvPr/>
+            </p:nvSpPr>
+            <p:spPr>
+              <a:xfrm>
+                <a:off x="2364487" y="922788"/>
+                <a:ext cx="5068159" cy="2022099"/>
+              </a:xfrm>
+              <a:prstGeom prst="roundRect">
+                <a:avLst>
+                  <a:gd name="adj" fmla="val 3803"/>
+                </a:avLst>
+              </a:prstGeom>
+              <a:noFill/>
+              <a:ln>
+                <a:solidFill>
+                  <a:schemeClr val="tx2"/>
+                </a:solidFill>
+                <a:prstDash val="dashDot"/>
+              </a:ln>
+            </p:spPr>
+            <p:style>
+              <a:lnRef idx="0">
+                <a:scrgbClr r="0" g="0" b="0"/>
+              </a:lnRef>
+              <a:fillRef idx="0">
+                <a:scrgbClr r="0" g="0" b="0"/>
+              </a:fillRef>
+              <a:effectRef idx="0">
+                <a:scrgbClr r="0" g="0" b="0"/>
+              </a:effectRef>
+              <a:fontRef idx="minor">
+                <a:schemeClr val="lt1"/>
+              </a:fontRef>
+            </p:style>
+            <p:txBody>
+              <a:bodyPr rtlCol="0" anchor="ctr"/>
+              <a:lstStyle/>
+              <a:p>
+                <a:pPr algn="ctr"/>
+                <a:endParaRPr lang="en-US" sz="1100" dirty="0">
+                  <a:solidFill>
+                    <a:schemeClr val="tx1"/>
+                  </a:solidFill>
+                </a:endParaRPr>
+              </a:p>
+            </p:txBody>
+          </p:sp>
+          <p:sp>
+            <p:nvSpPr>
+              <p:cNvPr id="53" name="Rectangle: Rounded Corners 52">
+                <a:extLst>
+                  <a:ext uri="{FF2B5EF4-FFF2-40B4-BE49-F238E27FC236}">
+                    <a16:creationId xmlns:a16="http://schemas.microsoft.com/office/drawing/2014/main" id="{936C6858-FF52-45EA-ACA7-420AEBF4F284}"/>
+                  </a:ext>
+                </a:extLst>
+              </p:cNvPr>
+              <p:cNvSpPr/>
+              <p:nvPr/>
+            </p:nvSpPr>
+            <p:spPr>
+              <a:xfrm>
+                <a:off x="4419009" y="2877424"/>
+                <a:ext cx="3013637" cy="1572230"/>
+              </a:xfrm>
+              <a:prstGeom prst="roundRect">
+                <a:avLst>
+                  <a:gd name="adj" fmla="val 3803"/>
+                </a:avLst>
+              </a:prstGeom>
+              <a:noFill/>
+              <a:ln>
+                <a:solidFill>
+                  <a:schemeClr val="tx2"/>
+                </a:solidFill>
+                <a:prstDash val="dashDot"/>
+              </a:ln>
+            </p:spPr>
+            <p:style>
+              <a:lnRef idx="0">
+                <a:scrgbClr r="0" g="0" b="0"/>
+              </a:lnRef>
+              <a:fillRef idx="0">
+                <a:scrgbClr r="0" g="0" b="0"/>
+              </a:fillRef>
+              <a:effectRef idx="0">
+                <a:scrgbClr r="0" g="0" b="0"/>
+              </a:effectRef>
+              <a:fontRef idx="minor">
+                <a:schemeClr val="lt1"/>
+              </a:fontRef>
+            </p:style>
+            <p:txBody>
+              <a:bodyPr rtlCol="0" anchor="ctr"/>
+              <a:lstStyle/>
+              <a:p>
+                <a:pPr algn="ctr"/>
+                <a:endParaRPr lang="en-US" sz="1100" dirty="0">
+                  <a:solidFill>
+                    <a:schemeClr val="tx1"/>
+                  </a:solidFill>
+                </a:endParaRPr>
+              </a:p>
+            </p:txBody>
+          </p:sp>
+          <p:sp>
+            <p:nvSpPr>
+              <p:cNvPr id="35" name="Rectangle 34">
+                <a:extLst>
+                  <a:ext uri="{FF2B5EF4-FFF2-40B4-BE49-F238E27FC236}">
+                    <a16:creationId xmlns:a16="http://schemas.microsoft.com/office/drawing/2014/main" id="{4DD84491-AECB-42F4-ADB6-39E6450AD250}"/>
+                  </a:ext>
+                </a:extLst>
+              </p:cNvPr>
+              <p:cNvSpPr/>
+              <p:nvPr/>
+            </p:nvSpPr>
+            <p:spPr>
+              <a:xfrm>
+                <a:off x="4435797" y="2869180"/>
+                <a:ext cx="2988459" cy="171418"/>
+              </a:xfrm>
+              <a:prstGeom prst="rect">
+                <a:avLst/>
+              </a:prstGeom>
+              <a:solidFill>
+                <a:schemeClr val="bg1"/>
+              </a:solidFill>
+              <a:ln>
+                <a:noFill/>
+              </a:ln>
+            </p:spPr>
+            <p:style>
+              <a:lnRef idx="2">
+                <a:schemeClr val="accent1">
+                  <a:shade val="50000"/>
+                </a:schemeClr>
+              </a:lnRef>
+              <a:fillRef idx="1">
+                <a:schemeClr val="accent1"/>
+              </a:fillRef>
+              <a:effectRef idx="0">
+                <a:schemeClr val="accent1"/>
+              </a:effectRef>
+              <a:fontRef idx="minor">
+                <a:schemeClr val="lt1"/>
+              </a:fontRef>
+            </p:style>
+            <p:txBody>
+              <a:bodyPr rtlCol="0" anchor="ctr"/>
+              <a:lstStyle/>
+              <a:p>
+                <a:pPr algn="ctr"/>
+                <a:endParaRPr lang="en-US"/>
+              </a:p>
+            </p:txBody>
+          </p:sp>
+        </p:grpSp>
         <mc:AlternateContent xmlns:mc="http://schemas.openxmlformats.org/markup-compatibility/2006">
           <mc:Choice xmlns:a14="http://schemas.microsoft.com/office/drawing/2010/main" Requires="a14">
             <p:sp>
@@ -10083,7 +10270,7 @@
           </p:nvSpPr>
           <p:spPr>
             <a:xfrm>
-              <a:off x="7677072" y="1060067"/>
+              <a:off x="4592789" y="3692476"/>
               <a:ext cx="1947467" cy="550147"/>
             </a:xfrm>
             <a:prstGeom prst="snip1Rect">
@@ -10310,18 +10497,18 @@
             <p:cNvCxnSpPr>
               <a:cxnSpLocks/>
               <a:stCxn id="58" idx="0"/>
-              <a:endCxn id="83" idx="2"/>
+              <a:endCxn id="83" idx="0"/>
             </p:cNvCxnSpPr>
             <p:nvPr/>
           </p:nvCxnSpPr>
           <p:spPr>
-            <a:xfrm flipV="1">
-              <a:off x="6932553" y="1335141"/>
-              <a:ext cx="744519" cy="445595"/>
+            <a:xfrm flipH="1">
+              <a:off x="6540256" y="1780736"/>
+              <a:ext cx="392297" cy="2186814"/>
             </a:xfrm>
             <a:prstGeom prst="bentConnector3">
               <a:avLst>
-                <a:gd name="adj1" fmla="val 50000"/>
+                <a:gd name="adj1" fmla="val -94625"/>
               </a:avLst>
             </a:prstGeom>
             <a:ln>
@@ -10357,7 +10544,7 @@
           </p:nvSpPr>
           <p:spPr>
             <a:xfrm>
-              <a:off x="6932553" y="1224308"/>
+              <a:off x="6593689" y="3587506"/>
               <a:ext cx="925233" cy="600164"/>
             </a:xfrm>
             <a:prstGeom prst="rect">
@@ -10399,8 +10586,8 @@
           </p:nvSpPr>
           <p:spPr>
             <a:xfrm>
-              <a:off x="8413556" y="2320293"/>
-              <a:ext cx="1105810" cy="429238"/>
+              <a:off x="4592789" y="3151918"/>
+              <a:ext cx="1947467" cy="429238"/>
             </a:xfrm>
             <a:prstGeom prst="snip1Rect">
               <a:avLst/>
@@ -10456,18 +10643,18 @@
             <p:cNvCxnSpPr>
               <a:cxnSpLocks/>
               <a:stCxn id="90" idx="0"/>
-              <a:endCxn id="114" idx="2"/>
+              <a:endCxn id="114" idx="0"/>
             </p:cNvCxnSpPr>
             <p:nvPr/>
           </p:nvCxnSpPr>
           <p:spPr>
-            <a:xfrm flipV="1">
-              <a:off x="6932553" y="2534912"/>
-              <a:ext cx="1481003" cy="1386"/>
+            <a:xfrm flipH="1">
+              <a:off x="6540256" y="2536298"/>
+              <a:ext cx="392297" cy="830239"/>
             </a:xfrm>
             <a:prstGeom prst="bentConnector3">
               <a:avLst>
-                <a:gd name="adj1" fmla="val 50000"/>
+                <a:gd name="adj1" fmla="val -58272"/>
               </a:avLst>
             </a:prstGeom>
             <a:ln>
@@ -10500,15 +10687,15 @@
             </p:cNvPr>
             <p:cNvCxnSpPr>
               <a:cxnSpLocks/>
-              <a:stCxn id="83" idx="1"/>
-              <a:endCxn id="114" idx="3"/>
+              <a:stCxn id="83" idx="3"/>
+              <a:endCxn id="114" idx="1"/>
             </p:cNvCxnSpPr>
             <p:nvPr/>
           </p:nvCxnSpPr>
           <p:spPr>
-            <a:xfrm rot="16200000" flipH="1">
-              <a:off x="8453594" y="1807425"/>
-              <a:ext cx="710079" cy="315655"/>
+            <a:xfrm rot="5400000" flipH="1" flipV="1">
+              <a:off x="5510863" y="3636816"/>
+              <a:ext cx="111320" cy="12700"/>
             </a:xfrm>
             <a:prstGeom prst="bentConnector3">
               <a:avLst>
@@ -10548,7 +10735,7 @@
           </p:nvSpPr>
           <p:spPr>
             <a:xfrm>
-              <a:off x="10158648" y="1650300"/>
+              <a:off x="2641952" y="3663539"/>
               <a:ext cx="1126778" cy="552983"/>
             </a:xfrm>
             <a:prstGeom prst="roundRect">
@@ -10595,63 +10782,6 @@
         </p:sp>
         <p:sp>
           <p:nvSpPr>
-            <p:cNvPr id="130" name="Rectangle: Rounded Corners 129">
-              <a:extLst>
-                <a:ext uri="{FF2B5EF4-FFF2-40B4-BE49-F238E27FC236}">
-                  <a16:creationId xmlns:a16="http://schemas.microsoft.com/office/drawing/2014/main" id="{61F7DE67-435C-4810-A6C0-92E2BC4DAC87}"/>
-                </a:ext>
-              </a:extLst>
-            </p:cNvPr>
-            <p:cNvSpPr/>
-            <p:nvPr/>
-          </p:nvSpPr>
-          <p:spPr>
-            <a:xfrm>
-              <a:off x="2364487" y="922789"/>
-              <a:ext cx="7450631" cy="2018820"/>
-            </a:xfrm>
-            <a:prstGeom prst="roundRect">
-              <a:avLst>
-                <a:gd name="adj" fmla="val 3803"/>
-              </a:avLst>
-            </a:prstGeom>
-            <a:noFill/>
-            <a:ln>
-              <a:solidFill>
-                <a:schemeClr val="tx2"/>
-              </a:solidFill>
-              <a:prstDash val="dashDot"/>
-            </a:ln>
-          </p:spPr>
-          <p:style>
-            <a:lnRef idx="0">
-              <a:scrgbClr r="0" g="0" b="0"/>
-            </a:lnRef>
-            <a:fillRef idx="0">
-              <a:scrgbClr r="0" g="0" b="0"/>
-            </a:fillRef>
-            <a:effectRef idx="0">
-              <a:scrgbClr r="0" g="0" b="0"/>
-            </a:effectRef>
-            <a:fontRef idx="minor">
-              <a:schemeClr val="lt1"/>
-            </a:fontRef>
-          </p:style>
-          <p:txBody>
-            <a:bodyPr rtlCol="0" anchor="ctr"/>
-            <a:lstStyle/>
-            <a:p>
-              <a:pPr algn="ctr"/>
-              <a:endParaRPr lang="en-US" sz="1100" dirty="0">
-                <a:solidFill>
-                  <a:schemeClr val="tx1"/>
-                </a:solidFill>
-              </a:endParaRPr>
-            </a:p>
-          </p:txBody>
-        </p:sp>
-        <p:sp>
-          <p:nvSpPr>
             <p:cNvPr id="131" name="TextBox 130">
               <a:extLst>
                 <a:ext uri="{FF2B5EF4-FFF2-40B4-BE49-F238E27FC236}">
@@ -10664,7 +10794,7 @@
           </p:nvSpPr>
           <p:spPr>
             <a:xfrm>
-              <a:off x="5298902" y="2936345"/>
+              <a:off x="3190618" y="3387805"/>
               <a:ext cx="1308931" cy="261610"/>
             </a:xfrm>
             <a:prstGeom prst="rect">
@@ -10702,15 +10832,16 @@
               </a:extLst>
             </p:cNvPr>
             <p:cNvCxnSpPr>
-              <a:stCxn id="130" idx="3"/>
-              <a:endCxn id="129" idx="1"/>
+              <a:cxnSpLocks/>
+              <a:stCxn id="53" idx="1"/>
+              <a:endCxn id="129" idx="3"/>
             </p:cNvCxnSpPr>
             <p:nvPr/>
           </p:nvCxnSpPr>
           <p:spPr>
-            <a:xfrm flipV="1">
-              <a:off x="9815118" y="1926792"/>
-              <a:ext cx="343530" cy="5407"/>
+            <a:xfrm flipH="1">
+              <a:off x="3768730" y="3663539"/>
+              <a:ext cx="650279" cy="276492"/>
             </a:xfrm>
             <a:prstGeom prst="straightConnector1">
               <a:avLst/>

</xml_diff>